<commit_message>
update presentation, app runs on port 8080
</commit_message>
<xml_diff>
--- a/doc/json-schema.pptx
+++ b/doc/json-schema.pptx
@@ -5,7 +5,7 @@
     <p:sldMasterId id="2147483672" r:id="rId1"/>
   </p:sldMasterIdLst>
   <p:notesMasterIdLst>
-    <p:notesMasterId r:id="rId27"/>
+    <p:notesMasterId r:id="rId28"/>
   </p:notesMasterIdLst>
   <p:sldIdLst>
     <p:sldId id="256" r:id="rId2"/>
@@ -27,12 +27,13 @@
     <p:sldId id="277" r:id="rId18"/>
     <p:sldId id="261" r:id="rId19"/>
     <p:sldId id="279" r:id="rId20"/>
-    <p:sldId id="283" r:id="rId21"/>
-    <p:sldId id="280" r:id="rId22"/>
-    <p:sldId id="282" r:id="rId23"/>
-    <p:sldId id="262" r:id="rId24"/>
-    <p:sldId id="278" r:id="rId25"/>
-    <p:sldId id="284" r:id="rId26"/>
+    <p:sldId id="285" r:id="rId21"/>
+    <p:sldId id="286" r:id="rId22"/>
+    <p:sldId id="283" r:id="rId23"/>
+    <p:sldId id="280" r:id="rId24"/>
+    <p:sldId id="282" r:id="rId25"/>
+    <p:sldId id="262" r:id="rId26"/>
+    <p:sldId id="278" r:id="rId27"/>
   </p:sldIdLst>
   <p:sldSz cx="12192000" cy="6858000"/>
   <p:notesSz cx="6858000" cy="9144000"/>
@@ -11949,7 +11950,7 @@
           <a:p>
             <a:r>
               <a:rPr lang="de-DE" dirty="0"/>
-              <a:t>Datentypen im Array</a:t>
+              <a:t>Arrays (1/3)</a:t>
             </a:r>
           </a:p>
         </p:txBody>
@@ -11982,19 +11983,17 @@
           <a:p>
             <a:r>
               <a:rPr lang="de-DE" dirty="0"/>
-              <a:t>Verwendung des </a:t>
-            </a:r>
-            <a:r>
-              <a:rPr lang="de-DE" dirty="0" err="1"/>
-              <a:t>Schlsselworts</a:t>
-            </a:r>
-            <a:r>
-              <a:rPr lang="de-DE" dirty="0"/>
-              <a:t> </a:t>
+              <a:t>Verwendung des Schlüsselworts </a:t>
             </a:r>
             <a:r>
               <a:rPr lang="de-DE" b="1" dirty="0"/>
               <a:t>item</a:t>
+            </a:r>
+          </a:p>
+          <a:p>
+            <a:r>
+              <a:rPr lang="de-DE" dirty="0"/>
+              <a:t>Festlegung eines Datentyps für alle Elemente</a:t>
             </a:r>
           </a:p>
         </p:txBody>
@@ -12100,7 +12099,7 @@
         </p:nvSpPr>
         <p:spPr>
           <a:xfrm>
-            <a:off x="6708059" y="2950084"/>
+            <a:off x="6708059" y="3612815"/>
             <a:ext cx="4608870" cy="369332"/>
           </a:xfrm>
           <a:prstGeom prst="rect">
@@ -12200,7 +12199,7 @@
         </p:nvSpPr>
         <p:spPr>
           <a:xfrm>
-            <a:off x="6708059" y="3356720"/>
+            <a:off x="6708059" y="4019451"/>
             <a:ext cx="4608870" cy="369332"/>
           </a:xfrm>
           <a:prstGeom prst="rect">
@@ -12303,7 +12302,7 @@
         </p:nvSpPr>
         <p:spPr>
           <a:xfrm>
-            <a:off x="875071" y="2551837"/>
+            <a:off x="875071" y="3214568"/>
             <a:ext cx="4608870" cy="1754326"/>
           </a:xfrm>
           <a:prstGeom prst="rect">
@@ -12620,7 +12619,7 @@
         </p:nvSpPr>
         <p:spPr>
           <a:xfrm>
-            <a:off x="6708059" y="2551837"/>
+            <a:off x="6708059" y="3214568"/>
             <a:ext cx="4608870" cy="369332"/>
           </a:xfrm>
           <a:prstGeom prst="rect">
@@ -12721,58 +12720,6 @@
               <a:t>]</a:t>
             </a:r>
             <a:endParaRPr lang="de-DE" dirty="0"/>
-          </a:p>
-        </p:txBody>
-      </p:sp>
-      <p:sp>
-        <p:nvSpPr>
-          <p:cNvPr id="18" name="Rechteck 17">
-            <a:extLst>
-              <a:ext uri="{FF2B5EF4-FFF2-40B4-BE49-F238E27FC236}">
-                <a16:creationId xmlns:a16="http://schemas.microsoft.com/office/drawing/2014/main" id="{0DD55F42-487B-4B21-B1CD-FC04930A09AC}"/>
-              </a:ext>
-            </a:extLst>
-          </p:cNvPr>
-          <p:cNvSpPr/>
-          <p:nvPr/>
-        </p:nvSpPr>
-        <p:spPr>
-          <a:xfrm>
-            <a:off x="3048000" y="2967335"/>
-            <a:ext cx="6096000" cy="923330"/>
-          </a:xfrm>
-          <a:prstGeom prst="rect">
-            <a:avLst/>
-          </a:prstGeom>
-        </p:spPr>
-        <p:txBody>
-          <a:bodyPr>
-            <a:spAutoFit/>
-          </a:bodyPr>
-          <a:lstStyle/>
-          <a:p>
-            <a:endParaRPr lang="de-DE" dirty="0">
-              <a:solidFill>
-                <a:srgbClr val="000000"/>
-              </a:solidFill>
-              <a:latin typeface="Source Code Pro" panose="020B0509030403020204" pitchFamily="49" charset="0"/>
-            </a:endParaRPr>
-          </a:p>
-          <a:p>
-            <a:endParaRPr lang="de-DE" dirty="0">
-              <a:solidFill>
-                <a:srgbClr val="000000"/>
-              </a:solidFill>
-              <a:latin typeface="Source Code Pro" panose="020B0509030403020204" pitchFamily="49" charset="0"/>
-            </a:endParaRPr>
-          </a:p>
-          <a:p>
-            <a:endParaRPr lang="de-DE" dirty="0">
-              <a:solidFill>
-                <a:srgbClr val="000000"/>
-              </a:solidFill>
-              <a:latin typeface="Source Code Pro" panose="020B0509030403020204" pitchFamily="49" charset="0"/>
-            </a:endParaRPr>
           </a:p>
         </p:txBody>
       </p:sp>
@@ -13020,7 +12967,7 @@
           <a:p>
             <a:r>
               <a:rPr lang="de-DE" dirty="0"/>
-              <a:t>Komplexe Wertebereiche</a:t>
+              <a:t>Arrays (2/3)</a:t>
             </a:r>
           </a:p>
         </p:txBody>
@@ -13052,28 +12999,8 @@
           <a:lstStyle/>
           <a:p>
             <a:r>
-              <a:rPr lang="de-DE" dirty="0" err="1"/>
-              <a:t>allOf</a:t>
-            </a:r>
-            <a:r>
               <a:rPr lang="de-DE" dirty="0"/>
-              <a:t>/</a:t>
-            </a:r>
-            <a:r>
-              <a:rPr lang="de-DE" dirty="0" err="1"/>
-              <a:t>anyOf</a:t>
-            </a:r>
-            <a:r>
-              <a:rPr lang="de-DE" dirty="0"/>
-              <a:t>/</a:t>
-            </a:r>
-            <a:r>
-              <a:rPr lang="de-DE" dirty="0" err="1"/>
-              <a:t>oneOf</a:t>
-            </a:r>
-            <a:r>
-              <a:rPr lang="de-DE" dirty="0"/>
-              <a:t>/not</a:t>
+              <a:t>Prüfung von Tupeln</a:t>
             </a:r>
           </a:p>
         </p:txBody>
@@ -13101,7 +13028,7 @@
           <a:p>
             <a:fld id="{CFFA1D88-5C5F-47BF-8575-62828799C3D3}" type="datetime1">
               <a:rPr lang="de-DE" smtClean="0"/>
-              <a:t>09.12.2017</a:t>
+              <a:t>10.12.2017</a:t>
             </a:fld>
             <a:endParaRPr lang="de-DE" dirty="0"/>
           </a:p>
@@ -13160,6 +13087,2541 @@
             <a:fld id="{4DEAFF03-B2A3-4F10-AFBA-713F9B73CAA7}" type="slidenum">
               <a:rPr lang="de-DE" smtClean="0"/>
               <a:t>19</a:t>
+            </a:fld>
+            <a:endParaRPr lang="de-DE"/>
+          </a:p>
+        </p:txBody>
+      </p:sp>
+      <p:sp>
+        <p:nvSpPr>
+          <p:cNvPr id="9" name="Rechteck 8">
+            <a:extLst>
+              <a:ext uri="{FF2B5EF4-FFF2-40B4-BE49-F238E27FC236}">
+                <a16:creationId xmlns:a16="http://schemas.microsoft.com/office/drawing/2014/main" id="{D53069BA-2455-49E1-8360-B8F571081120}"/>
+              </a:ext>
+            </a:extLst>
+          </p:cNvPr>
+          <p:cNvSpPr/>
+          <p:nvPr/>
+        </p:nvSpPr>
+        <p:spPr>
+          <a:xfrm>
+            <a:off x="6750963" y="4016846"/>
+            <a:ext cx="4608870" cy="369332"/>
+          </a:xfrm>
+          <a:prstGeom prst="rect">
+            <a:avLst/>
+          </a:prstGeom>
+          <a:solidFill>
+            <a:srgbClr val="FFCCCC"/>
+          </a:solidFill>
+          <a:ln>
+            <a:noFill/>
+          </a:ln>
+        </p:spPr>
+        <p:txBody>
+          <a:bodyPr wrap="square">
+            <a:spAutoFit/>
+          </a:bodyPr>
+          <a:lstStyle/>
+          <a:p>
+            <a:r>
+              <a:rPr lang="de-DE" b="1" dirty="0">
+                <a:solidFill>
+                  <a:srgbClr val="4472C4"/>
+                </a:solidFill>
+                <a:latin typeface="Source Code Pro" panose="020B0509030403020204" pitchFamily="49" charset="0"/>
+              </a:rPr>
+              <a:t>[</a:t>
+            </a:r>
+            <a:r>
+              <a:rPr lang="de-DE" dirty="0">
+                <a:solidFill>
+                  <a:srgbClr val="464646"/>
+                </a:solidFill>
+                <a:latin typeface="Source Code Pro" panose="020B0509030403020204" pitchFamily="49" charset="0"/>
+              </a:rPr>
+              <a:t>"Street"</a:t>
+            </a:r>
+            <a:r>
+              <a:rPr lang="de-DE" b="1" dirty="0">
+                <a:solidFill>
+                  <a:srgbClr val="4472C4"/>
+                </a:solidFill>
+                <a:latin typeface="Source Code Pro" panose="020B0509030403020204" pitchFamily="49" charset="0"/>
+              </a:rPr>
+              <a:t>]</a:t>
+            </a:r>
+            <a:endParaRPr lang="de-DE" dirty="0"/>
+          </a:p>
+        </p:txBody>
+      </p:sp>
+      <p:sp>
+        <p:nvSpPr>
+          <p:cNvPr id="10" name="Rechteck 9">
+            <a:extLst>
+              <a:ext uri="{FF2B5EF4-FFF2-40B4-BE49-F238E27FC236}">
+                <a16:creationId xmlns:a16="http://schemas.microsoft.com/office/drawing/2014/main" id="{D25901EF-A678-4817-B6A5-9EDBC02FD598}"/>
+              </a:ext>
+            </a:extLst>
+          </p:cNvPr>
+          <p:cNvSpPr/>
+          <p:nvPr/>
+        </p:nvSpPr>
+        <p:spPr>
+          <a:xfrm>
+            <a:off x="6744930" y="3614976"/>
+            <a:ext cx="4608870" cy="369332"/>
+          </a:xfrm>
+          <a:prstGeom prst="rect">
+            <a:avLst/>
+          </a:prstGeom>
+          <a:solidFill>
+            <a:schemeClr val="accent6">
+              <a:lumMod val="40000"/>
+              <a:lumOff val="60000"/>
+            </a:schemeClr>
+          </a:solidFill>
+          <a:ln>
+            <a:noFill/>
+          </a:ln>
+        </p:spPr>
+        <p:txBody>
+          <a:bodyPr wrap="square">
+            <a:spAutoFit/>
+          </a:bodyPr>
+          <a:lstStyle/>
+          <a:p>
+            <a:r>
+              <a:rPr lang="de-DE" b="1" dirty="0">
+                <a:solidFill>
+                  <a:srgbClr val="4472C4"/>
+                </a:solidFill>
+                <a:latin typeface="Source Code Pro" panose="020B0509030403020204" pitchFamily="49" charset="0"/>
+              </a:rPr>
+              <a:t>[</a:t>
+            </a:r>
+            <a:r>
+              <a:rPr lang="de-DE" dirty="0">
+                <a:solidFill>
+                  <a:srgbClr val="FF8000"/>
+                </a:solidFill>
+                <a:latin typeface="Source Code Pro" panose="020B0509030403020204" pitchFamily="49" charset="0"/>
+              </a:rPr>
+              <a:t>1600</a:t>
+            </a:r>
+            <a:r>
+              <a:rPr lang="de-DE" b="1" dirty="0">
+                <a:solidFill>
+                  <a:srgbClr val="4472C4"/>
+                </a:solidFill>
+                <a:latin typeface="Source Code Pro" panose="020B0509030403020204" pitchFamily="49" charset="0"/>
+              </a:rPr>
+              <a:t>,</a:t>
+            </a:r>
+            <a:r>
+              <a:rPr lang="de-DE" dirty="0">
+                <a:solidFill>
+                  <a:srgbClr val="000000"/>
+                </a:solidFill>
+                <a:latin typeface="Source Code Pro" panose="020B0509030403020204" pitchFamily="49" charset="0"/>
+              </a:rPr>
+              <a:t> </a:t>
+            </a:r>
+            <a:r>
+              <a:rPr lang="de-DE" dirty="0">
+                <a:solidFill>
+                  <a:srgbClr val="464646"/>
+                </a:solidFill>
+                <a:latin typeface="Source Code Pro" panose="020B0509030403020204" pitchFamily="49" charset="0"/>
+              </a:rPr>
+              <a:t>"Pennsylvania"</a:t>
+            </a:r>
+            <a:r>
+              <a:rPr lang="de-DE" b="1" dirty="0">
+                <a:solidFill>
+                  <a:srgbClr val="4472C4"/>
+                </a:solidFill>
+                <a:latin typeface="Source Code Pro" panose="020B0509030403020204" pitchFamily="49" charset="0"/>
+              </a:rPr>
+              <a:t>,</a:t>
+            </a:r>
+            <a:r>
+              <a:rPr lang="de-DE" dirty="0">
+                <a:solidFill>
+                  <a:srgbClr val="000000"/>
+                </a:solidFill>
+                <a:latin typeface="Source Code Pro" panose="020B0509030403020204" pitchFamily="49" charset="0"/>
+              </a:rPr>
+              <a:t> </a:t>
+            </a:r>
+            <a:r>
+              <a:rPr lang="de-DE" dirty="0">
+                <a:solidFill>
+                  <a:srgbClr val="464646"/>
+                </a:solidFill>
+                <a:latin typeface="Source Code Pro" panose="020B0509030403020204" pitchFamily="49" charset="0"/>
+              </a:rPr>
+              <a:t>"Avenue"</a:t>
+            </a:r>
+            <a:r>
+              <a:rPr lang="de-DE" b="1" dirty="0">
+                <a:solidFill>
+                  <a:srgbClr val="4472C4"/>
+                </a:solidFill>
+                <a:latin typeface="Source Code Pro" panose="020B0509030403020204" pitchFamily="49" charset="0"/>
+              </a:rPr>
+              <a:t>]</a:t>
+            </a:r>
+            <a:endParaRPr lang="de-DE" dirty="0">
+              <a:solidFill>
+                <a:srgbClr val="000000"/>
+              </a:solidFill>
+              <a:latin typeface="Source Code Pro" panose="020B0509030403020204" pitchFamily="49" charset="0"/>
+            </a:endParaRPr>
+          </a:p>
+        </p:txBody>
+      </p:sp>
+      <p:sp>
+        <p:nvSpPr>
+          <p:cNvPr id="15" name="Rechteck 14">
+            <a:extLst>
+              <a:ext uri="{FF2B5EF4-FFF2-40B4-BE49-F238E27FC236}">
+                <a16:creationId xmlns:a16="http://schemas.microsoft.com/office/drawing/2014/main" id="{F70FF213-92D6-4856-BBE6-F637FCF0A058}"/>
+              </a:ext>
+            </a:extLst>
+          </p:cNvPr>
+          <p:cNvSpPr/>
+          <p:nvPr/>
+        </p:nvSpPr>
+        <p:spPr>
+          <a:xfrm>
+            <a:off x="6750004" y="3214568"/>
+            <a:ext cx="4608870" cy="369332"/>
+          </a:xfrm>
+          <a:prstGeom prst="rect">
+            <a:avLst/>
+          </a:prstGeom>
+          <a:solidFill>
+            <a:srgbClr val="FFCCCC"/>
+          </a:solidFill>
+          <a:ln>
+            <a:noFill/>
+          </a:ln>
+        </p:spPr>
+        <p:txBody>
+          <a:bodyPr wrap="square">
+            <a:spAutoFit/>
+          </a:bodyPr>
+          <a:lstStyle/>
+          <a:p>
+            <a:r>
+              <a:rPr lang="de-DE" b="1" dirty="0">
+                <a:solidFill>
+                  <a:srgbClr val="4472C4"/>
+                </a:solidFill>
+                <a:latin typeface="Source Code Pro" panose="020B0509030403020204" pitchFamily="49" charset="0"/>
+              </a:rPr>
+              <a:t>[</a:t>
+            </a:r>
+            <a:r>
+              <a:rPr lang="de-DE" dirty="0">
+                <a:solidFill>
+                  <a:srgbClr val="FF8000"/>
+                </a:solidFill>
+                <a:latin typeface="Source Code Pro" panose="020B0509030403020204" pitchFamily="49" charset="0"/>
+              </a:rPr>
+              <a:t>24</a:t>
+            </a:r>
+            <a:r>
+              <a:rPr lang="de-DE" b="1" dirty="0">
+                <a:solidFill>
+                  <a:srgbClr val="4472C4"/>
+                </a:solidFill>
+                <a:latin typeface="Source Code Pro" panose="020B0509030403020204" pitchFamily="49" charset="0"/>
+              </a:rPr>
+              <a:t>,</a:t>
+            </a:r>
+            <a:r>
+              <a:rPr lang="de-DE" dirty="0">
+                <a:solidFill>
+                  <a:srgbClr val="000000"/>
+                </a:solidFill>
+                <a:latin typeface="Source Code Pro" panose="020B0509030403020204" pitchFamily="49" charset="0"/>
+              </a:rPr>
+              <a:t> </a:t>
+            </a:r>
+            <a:r>
+              <a:rPr lang="de-DE" dirty="0">
+                <a:solidFill>
+                  <a:srgbClr val="464646"/>
+                </a:solidFill>
+                <a:latin typeface="Source Code Pro" panose="020B0509030403020204" pitchFamily="49" charset="0"/>
+              </a:rPr>
+              <a:t>"Sussex"</a:t>
+            </a:r>
+            <a:r>
+              <a:rPr lang="de-DE" b="1" dirty="0">
+                <a:solidFill>
+                  <a:srgbClr val="4472C4"/>
+                </a:solidFill>
+                <a:latin typeface="Source Code Pro" panose="020B0509030403020204" pitchFamily="49" charset="0"/>
+              </a:rPr>
+              <a:t>,</a:t>
+            </a:r>
+            <a:r>
+              <a:rPr lang="de-DE" dirty="0">
+                <a:solidFill>
+                  <a:srgbClr val="000000"/>
+                </a:solidFill>
+                <a:latin typeface="Source Code Pro" panose="020B0509030403020204" pitchFamily="49" charset="0"/>
+              </a:rPr>
+              <a:t> </a:t>
+            </a:r>
+            <a:r>
+              <a:rPr lang="de-DE" dirty="0">
+                <a:solidFill>
+                  <a:srgbClr val="464646"/>
+                </a:solidFill>
+                <a:latin typeface="Source Code Pro" panose="020B0509030403020204" pitchFamily="49" charset="0"/>
+              </a:rPr>
+              <a:t>"Drive"</a:t>
+            </a:r>
+            <a:r>
+              <a:rPr lang="de-DE" b="1" dirty="0">
+                <a:solidFill>
+                  <a:srgbClr val="4472C4"/>
+                </a:solidFill>
+                <a:latin typeface="Source Code Pro" panose="020B0509030403020204" pitchFamily="49" charset="0"/>
+              </a:rPr>
+              <a:t>]</a:t>
+            </a:r>
+            <a:endParaRPr lang="de-DE" dirty="0"/>
+          </a:p>
+        </p:txBody>
+      </p:sp>
+      <p:sp>
+        <p:nvSpPr>
+          <p:cNvPr id="7" name="Rechteck 6">
+            <a:extLst>
+              <a:ext uri="{FF2B5EF4-FFF2-40B4-BE49-F238E27FC236}">
+                <a16:creationId xmlns:a16="http://schemas.microsoft.com/office/drawing/2014/main" id="{D82A133D-574A-4D69-B0F6-84CE3623EFA0}"/>
+              </a:ext>
+            </a:extLst>
+          </p:cNvPr>
+          <p:cNvSpPr/>
+          <p:nvPr/>
+        </p:nvSpPr>
+        <p:spPr>
+          <a:xfrm>
+            <a:off x="838200" y="2388671"/>
+            <a:ext cx="4983760" cy="3877985"/>
+          </a:xfrm>
+          <a:prstGeom prst="rect">
+            <a:avLst/>
+          </a:prstGeom>
+          <a:solidFill>
+            <a:schemeClr val="bg1">
+              <a:lumMod val="95000"/>
+            </a:schemeClr>
+          </a:solidFill>
+          <a:ln>
+            <a:solidFill>
+              <a:schemeClr val="bg1">
+                <a:lumMod val="85000"/>
+              </a:schemeClr>
+            </a:solidFill>
+          </a:ln>
+        </p:spPr>
+        <p:txBody>
+          <a:bodyPr wrap="square">
+            <a:spAutoFit/>
+          </a:bodyPr>
+          <a:lstStyle/>
+          <a:p>
+            <a:r>
+              <a:rPr lang="de-DE" sz="1600" b="1" dirty="0">
+                <a:solidFill>
+                  <a:srgbClr val="4472C4"/>
+                </a:solidFill>
+                <a:latin typeface="Source Code Pro" panose="020B0509030403020204" pitchFamily="49" charset="0"/>
+              </a:rPr>
+              <a:t>{</a:t>
+            </a:r>
+            <a:endParaRPr lang="de-DE" sz="1600" dirty="0">
+              <a:solidFill>
+                <a:srgbClr val="000000"/>
+              </a:solidFill>
+              <a:latin typeface="Source Code Pro" panose="020B0509030403020204" pitchFamily="49" charset="0"/>
+            </a:endParaRPr>
+          </a:p>
+          <a:p>
+            <a:r>
+              <a:rPr lang="de-DE" sz="1600" dirty="0">
+                <a:solidFill>
+                  <a:srgbClr val="000000"/>
+                </a:solidFill>
+                <a:latin typeface="Source Code Pro" panose="020B0509030403020204" pitchFamily="49" charset="0"/>
+              </a:rPr>
+              <a:t>  </a:t>
+            </a:r>
+            <a:r>
+              <a:rPr lang="de-DE" sz="1600" dirty="0">
+                <a:solidFill>
+                  <a:srgbClr val="464646"/>
+                </a:solidFill>
+                <a:latin typeface="Source Code Pro" panose="020B0509030403020204" pitchFamily="49" charset="0"/>
+              </a:rPr>
+              <a:t>"type"</a:t>
+            </a:r>
+            <a:r>
+              <a:rPr lang="de-DE" sz="1600" b="1" dirty="0">
+                <a:solidFill>
+                  <a:srgbClr val="4472C4"/>
+                </a:solidFill>
+                <a:latin typeface="Source Code Pro" panose="020B0509030403020204" pitchFamily="49" charset="0"/>
+              </a:rPr>
+              <a:t>:</a:t>
+            </a:r>
+            <a:r>
+              <a:rPr lang="de-DE" sz="1600" dirty="0">
+                <a:solidFill>
+                  <a:srgbClr val="000000"/>
+                </a:solidFill>
+                <a:latin typeface="Source Code Pro" panose="020B0509030403020204" pitchFamily="49" charset="0"/>
+              </a:rPr>
+              <a:t> </a:t>
+            </a:r>
+            <a:r>
+              <a:rPr lang="de-DE" sz="1600" dirty="0">
+                <a:solidFill>
+                  <a:srgbClr val="464646"/>
+                </a:solidFill>
+                <a:latin typeface="Source Code Pro" panose="020B0509030403020204" pitchFamily="49" charset="0"/>
+              </a:rPr>
+              <a:t>"</a:t>
+            </a:r>
+            <a:r>
+              <a:rPr lang="de-DE" sz="1600" dirty="0" err="1">
+                <a:solidFill>
+                  <a:srgbClr val="464646"/>
+                </a:solidFill>
+                <a:latin typeface="Source Code Pro" panose="020B0509030403020204" pitchFamily="49" charset="0"/>
+              </a:rPr>
+              <a:t>array</a:t>
+            </a:r>
+            <a:r>
+              <a:rPr lang="de-DE" sz="1600" dirty="0">
+                <a:solidFill>
+                  <a:srgbClr val="464646"/>
+                </a:solidFill>
+                <a:latin typeface="Source Code Pro" panose="020B0509030403020204" pitchFamily="49" charset="0"/>
+              </a:rPr>
+              <a:t>"</a:t>
+            </a:r>
+            <a:r>
+              <a:rPr lang="de-DE" sz="1600" b="1" dirty="0">
+                <a:solidFill>
+                  <a:srgbClr val="4472C4"/>
+                </a:solidFill>
+                <a:latin typeface="Source Code Pro" panose="020B0509030403020204" pitchFamily="49" charset="0"/>
+              </a:rPr>
+              <a:t>,</a:t>
+            </a:r>
+            <a:endParaRPr lang="de-DE" sz="1600" dirty="0">
+              <a:solidFill>
+                <a:srgbClr val="000000"/>
+              </a:solidFill>
+              <a:latin typeface="Source Code Pro" panose="020B0509030403020204" pitchFamily="49" charset="0"/>
+            </a:endParaRPr>
+          </a:p>
+          <a:p>
+            <a:r>
+              <a:rPr lang="de-DE" sz="1600" dirty="0">
+                <a:solidFill>
+                  <a:srgbClr val="000000"/>
+                </a:solidFill>
+                <a:latin typeface="Source Code Pro" panose="020B0509030403020204" pitchFamily="49" charset="0"/>
+              </a:rPr>
+              <a:t>  </a:t>
+            </a:r>
+            <a:r>
+              <a:rPr lang="de-DE" sz="1600" dirty="0">
+                <a:solidFill>
+                  <a:srgbClr val="464646"/>
+                </a:solidFill>
+                <a:latin typeface="Source Code Pro" panose="020B0509030403020204" pitchFamily="49" charset="0"/>
+              </a:rPr>
+              <a:t>"</a:t>
+            </a:r>
+            <a:r>
+              <a:rPr lang="de-DE" sz="1600" dirty="0" err="1">
+                <a:solidFill>
+                  <a:srgbClr val="464646"/>
+                </a:solidFill>
+                <a:latin typeface="Source Code Pro" panose="020B0509030403020204" pitchFamily="49" charset="0"/>
+              </a:rPr>
+              <a:t>items</a:t>
+            </a:r>
+            <a:r>
+              <a:rPr lang="de-DE" sz="1600" dirty="0">
+                <a:solidFill>
+                  <a:srgbClr val="464646"/>
+                </a:solidFill>
+                <a:latin typeface="Source Code Pro" panose="020B0509030403020204" pitchFamily="49" charset="0"/>
+              </a:rPr>
+              <a:t>"</a:t>
+            </a:r>
+            <a:r>
+              <a:rPr lang="de-DE" sz="1600" b="1" dirty="0">
+                <a:solidFill>
+                  <a:srgbClr val="4472C4"/>
+                </a:solidFill>
+                <a:latin typeface="Source Code Pro" panose="020B0509030403020204" pitchFamily="49" charset="0"/>
+              </a:rPr>
+              <a:t>:</a:t>
+            </a:r>
+            <a:r>
+              <a:rPr lang="de-DE" sz="1600" dirty="0">
+                <a:solidFill>
+                  <a:srgbClr val="000000"/>
+                </a:solidFill>
+                <a:latin typeface="Source Code Pro" panose="020B0509030403020204" pitchFamily="49" charset="0"/>
+              </a:rPr>
+              <a:t> </a:t>
+            </a:r>
+            <a:r>
+              <a:rPr lang="de-DE" sz="1600" b="1" dirty="0">
+                <a:solidFill>
+                  <a:srgbClr val="4472C4"/>
+                </a:solidFill>
+                <a:latin typeface="Source Code Pro" panose="020B0509030403020204" pitchFamily="49" charset="0"/>
+              </a:rPr>
+              <a:t>[</a:t>
+            </a:r>
+            <a:endParaRPr lang="de-DE" sz="1600" dirty="0">
+              <a:solidFill>
+                <a:srgbClr val="000000"/>
+              </a:solidFill>
+              <a:latin typeface="Source Code Pro" panose="020B0509030403020204" pitchFamily="49" charset="0"/>
+            </a:endParaRPr>
+          </a:p>
+          <a:p>
+            <a:r>
+              <a:rPr lang="de-DE" sz="1600" dirty="0">
+                <a:solidFill>
+                  <a:srgbClr val="000000"/>
+                </a:solidFill>
+                <a:latin typeface="Source Code Pro" panose="020B0509030403020204" pitchFamily="49" charset="0"/>
+              </a:rPr>
+              <a:t>    </a:t>
+            </a:r>
+            <a:r>
+              <a:rPr lang="de-DE" sz="1600" b="1" dirty="0">
+                <a:solidFill>
+                  <a:srgbClr val="4472C4"/>
+                </a:solidFill>
+                <a:latin typeface="Source Code Pro" panose="020B0509030403020204" pitchFamily="49" charset="0"/>
+              </a:rPr>
+              <a:t>{</a:t>
+            </a:r>
+            <a:endParaRPr lang="de-DE" sz="1600" dirty="0">
+              <a:solidFill>
+                <a:srgbClr val="000000"/>
+              </a:solidFill>
+              <a:latin typeface="Source Code Pro" panose="020B0509030403020204" pitchFamily="49" charset="0"/>
+            </a:endParaRPr>
+          </a:p>
+          <a:p>
+            <a:r>
+              <a:rPr lang="de-DE" sz="1600" dirty="0">
+                <a:solidFill>
+                  <a:srgbClr val="000000"/>
+                </a:solidFill>
+                <a:latin typeface="Source Code Pro" panose="020B0509030403020204" pitchFamily="49" charset="0"/>
+              </a:rPr>
+              <a:t>      </a:t>
+            </a:r>
+            <a:r>
+              <a:rPr lang="de-DE" sz="1600" dirty="0">
+                <a:solidFill>
+                  <a:srgbClr val="464646"/>
+                </a:solidFill>
+                <a:latin typeface="Source Code Pro" panose="020B0509030403020204" pitchFamily="49" charset="0"/>
+              </a:rPr>
+              <a:t>"type"</a:t>
+            </a:r>
+            <a:r>
+              <a:rPr lang="de-DE" sz="1600" b="1" dirty="0">
+                <a:solidFill>
+                  <a:srgbClr val="4472C4"/>
+                </a:solidFill>
+                <a:latin typeface="Source Code Pro" panose="020B0509030403020204" pitchFamily="49" charset="0"/>
+              </a:rPr>
+              <a:t>:</a:t>
+            </a:r>
+            <a:r>
+              <a:rPr lang="de-DE" sz="1600" dirty="0">
+                <a:solidFill>
+                  <a:srgbClr val="000000"/>
+                </a:solidFill>
+                <a:latin typeface="Source Code Pro" panose="020B0509030403020204" pitchFamily="49" charset="0"/>
+              </a:rPr>
+              <a:t> </a:t>
+            </a:r>
+            <a:r>
+              <a:rPr lang="de-DE" sz="1600" dirty="0">
+                <a:solidFill>
+                  <a:srgbClr val="464646"/>
+                </a:solidFill>
+                <a:latin typeface="Source Code Pro" panose="020B0509030403020204" pitchFamily="49" charset="0"/>
+              </a:rPr>
+              <a:t>"</a:t>
+            </a:r>
+            <a:r>
+              <a:rPr lang="de-DE" sz="1600" dirty="0" err="1">
+                <a:solidFill>
+                  <a:srgbClr val="464646"/>
+                </a:solidFill>
+                <a:latin typeface="Source Code Pro" panose="020B0509030403020204" pitchFamily="49" charset="0"/>
+              </a:rPr>
+              <a:t>number</a:t>
+            </a:r>
+            <a:r>
+              <a:rPr lang="de-DE" sz="1600" dirty="0">
+                <a:solidFill>
+                  <a:srgbClr val="464646"/>
+                </a:solidFill>
+                <a:latin typeface="Source Code Pro" panose="020B0509030403020204" pitchFamily="49" charset="0"/>
+              </a:rPr>
+              <a:t>"</a:t>
+            </a:r>
+            <a:endParaRPr lang="de-DE" sz="1600" dirty="0">
+              <a:solidFill>
+                <a:srgbClr val="000000"/>
+              </a:solidFill>
+              <a:latin typeface="Source Code Pro" panose="020B0509030403020204" pitchFamily="49" charset="0"/>
+            </a:endParaRPr>
+          </a:p>
+          <a:p>
+            <a:r>
+              <a:rPr lang="de-DE" sz="1600" dirty="0">
+                <a:solidFill>
+                  <a:srgbClr val="000000"/>
+                </a:solidFill>
+                <a:latin typeface="Source Code Pro" panose="020B0509030403020204" pitchFamily="49" charset="0"/>
+              </a:rPr>
+              <a:t>    </a:t>
+            </a:r>
+            <a:r>
+              <a:rPr lang="de-DE" sz="1600" b="1" dirty="0">
+                <a:solidFill>
+                  <a:srgbClr val="4472C4"/>
+                </a:solidFill>
+                <a:latin typeface="Source Code Pro" panose="020B0509030403020204" pitchFamily="49" charset="0"/>
+              </a:rPr>
+              <a:t>},</a:t>
+            </a:r>
+            <a:endParaRPr lang="de-DE" sz="1600" dirty="0">
+              <a:solidFill>
+                <a:srgbClr val="000000"/>
+              </a:solidFill>
+              <a:latin typeface="Source Code Pro" panose="020B0509030403020204" pitchFamily="49" charset="0"/>
+            </a:endParaRPr>
+          </a:p>
+          <a:p>
+            <a:r>
+              <a:rPr lang="de-DE" sz="1600" dirty="0">
+                <a:solidFill>
+                  <a:srgbClr val="000000"/>
+                </a:solidFill>
+                <a:latin typeface="Source Code Pro" panose="020B0509030403020204" pitchFamily="49" charset="0"/>
+              </a:rPr>
+              <a:t>    </a:t>
+            </a:r>
+            <a:r>
+              <a:rPr lang="de-DE" sz="1600" b="1" dirty="0">
+                <a:solidFill>
+                  <a:srgbClr val="4472C4"/>
+                </a:solidFill>
+                <a:latin typeface="Source Code Pro" panose="020B0509030403020204" pitchFamily="49" charset="0"/>
+              </a:rPr>
+              <a:t>{</a:t>
+            </a:r>
+            <a:endParaRPr lang="de-DE" sz="1600" dirty="0">
+              <a:solidFill>
+                <a:srgbClr val="000000"/>
+              </a:solidFill>
+              <a:latin typeface="Source Code Pro" panose="020B0509030403020204" pitchFamily="49" charset="0"/>
+            </a:endParaRPr>
+          </a:p>
+          <a:p>
+            <a:r>
+              <a:rPr lang="de-DE" sz="1600" dirty="0">
+                <a:solidFill>
+                  <a:srgbClr val="000000"/>
+                </a:solidFill>
+                <a:latin typeface="Source Code Pro" panose="020B0509030403020204" pitchFamily="49" charset="0"/>
+              </a:rPr>
+              <a:t>      </a:t>
+            </a:r>
+            <a:r>
+              <a:rPr lang="de-DE" sz="1600" dirty="0">
+                <a:solidFill>
+                  <a:srgbClr val="464646"/>
+                </a:solidFill>
+                <a:latin typeface="Source Code Pro" panose="020B0509030403020204" pitchFamily="49" charset="0"/>
+              </a:rPr>
+              <a:t>"type"</a:t>
+            </a:r>
+            <a:r>
+              <a:rPr lang="de-DE" sz="1600" b="1" dirty="0">
+                <a:solidFill>
+                  <a:srgbClr val="4472C4"/>
+                </a:solidFill>
+                <a:latin typeface="Source Code Pro" panose="020B0509030403020204" pitchFamily="49" charset="0"/>
+              </a:rPr>
+              <a:t>:</a:t>
+            </a:r>
+            <a:r>
+              <a:rPr lang="de-DE" sz="1600" dirty="0">
+                <a:solidFill>
+                  <a:srgbClr val="000000"/>
+                </a:solidFill>
+                <a:latin typeface="Source Code Pro" panose="020B0509030403020204" pitchFamily="49" charset="0"/>
+              </a:rPr>
+              <a:t> </a:t>
+            </a:r>
+            <a:r>
+              <a:rPr lang="de-DE" sz="1600" dirty="0">
+                <a:solidFill>
+                  <a:srgbClr val="464646"/>
+                </a:solidFill>
+                <a:latin typeface="Source Code Pro" panose="020B0509030403020204" pitchFamily="49" charset="0"/>
+              </a:rPr>
+              <a:t>"</a:t>
+            </a:r>
+            <a:r>
+              <a:rPr lang="de-DE" sz="1600" dirty="0" err="1">
+                <a:solidFill>
+                  <a:srgbClr val="464646"/>
+                </a:solidFill>
+                <a:latin typeface="Source Code Pro" panose="020B0509030403020204" pitchFamily="49" charset="0"/>
+              </a:rPr>
+              <a:t>string</a:t>
+            </a:r>
+            <a:r>
+              <a:rPr lang="de-DE" sz="1600" dirty="0">
+                <a:solidFill>
+                  <a:srgbClr val="464646"/>
+                </a:solidFill>
+                <a:latin typeface="Source Code Pro" panose="020B0509030403020204" pitchFamily="49" charset="0"/>
+              </a:rPr>
+              <a:t>"</a:t>
+            </a:r>
+            <a:endParaRPr lang="de-DE" sz="1600" dirty="0">
+              <a:solidFill>
+                <a:srgbClr val="000000"/>
+              </a:solidFill>
+              <a:latin typeface="Source Code Pro" panose="020B0509030403020204" pitchFamily="49" charset="0"/>
+            </a:endParaRPr>
+          </a:p>
+          <a:p>
+            <a:r>
+              <a:rPr lang="de-DE" sz="1600" dirty="0">
+                <a:solidFill>
+                  <a:srgbClr val="000000"/>
+                </a:solidFill>
+                <a:latin typeface="Source Code Pro" panose="020B0509030403020204" pitchFamily="49" charset="0"/>
+              </a:rPr>
+              <a:t>    </a:t>
+            </a:r>
+            <a:r>
+              <a:rPr lang="de-DE" sz="1600" b="1" dirty="0">
+                <a:solidFill>
+                  <a:srgbClr val="4472C4"/>
+                </a:solidFill>
+                <a:latin typeface="Source Code Pro" panose="020B0509030403020204" pitchFamily="49" charset="0"/>
+              </a:rPr>
+              <a:t>},</a:t>
+            </a:r>
+            <a:endParaRPr lang="de-DE" sz="1600" dirty="0">
+              <a:solidFill>
+                <a:srgbClr val="000000"/>
+              </a:solidFill>
+              <a:latin typeface="Source Code Pro" panose="020B0509030403020204" pitchFamily="49" charset="0"/>
+            </a:endParaRPr>
+          </a:p>
+          <a:p>
+            <a:r>
+              <a:rPr lang="de-DE" sz="1600" dirty="0">
+                <a:solidFill>
+                  <a:srgbClr val="000000"/>
+                </a:solidFill>
+                <a:latin typeface="Source Code Pro" panose="020B0509030403020204" pitchFamily="49" charset="0"/>
+              </a:rPr>
+              <a:t>    </a:t>
+            </a:r>
+            <a:r>
+              <a:rPr lang="de-DE" sz="1600" b="1" dirty="0">
+                <a:solidFill>
+                  <a:srgbClr val="4472C4"/>
+                </a:solidFill>
+                <a:latin typeface="Source Code Pro" panose="020B0509030403020204" pitchFamily="49" charset="0"/>
+              </a:rPr>
+              <a:t>{</a:t>
+            </a:r>
+            <a:endParaRPr lang="de-DE" sz="1600" dirty="0">
+              <a:solidFill>
+                <a:srgbClr val="000000"/>
+              </a:solidFill>
+              <a:latin typeface="Source Code Pro" panose="020B0509030403020204" pitchFamily="49" charset="0"/>
+            </a:endParaRPr>
+          </a:p>
+          <a:p>
+            <a:r>
+              <a:rPr lang="de-DE" sz="1600" dirty="0">
+                <a:solidFill>
+                  <a:srgbClr val="000000"/>
+                </a:solidFill>
+                <a:latin typeface="Source Code Pro" panose="020B0509030403020204" pitchFamily="49" charset="0"/>
+              </a:rPr>
+              <a:t>      </a:t>
+            </a:r>
+            <a:r>
+              <a:rPr lang="de-DE" sz="1600" dirty="0">
+                <a:solidFill>
+                  <a:srgbClr val="464646"/>
+                </a:solidFill>
+                <a:latin typeface="Source Code Pro" panose="020B0509030403020204" pitchFamily="49" charset="0"/>
+              </a:rPr>
+              <a:t>"type"</a:t>
+            </a:r>
+            <a:r>
+              <a:rPr lang="de-DE" sz="1600" b="1" dirty="0">
+                <a:solidFill>
+                  <a:srgbClr val="4472C4"/>
+                </a:solidFill>
+                <a:latin typeface="Source Code Pro" panose="020B0509030403020204" pitchFamily="49" charset="0"/>
+              </a:rPr>
+              <a:t>:</a:t>
+            </a:r>
+            <a:r>
+              <a:rPr lang="de-DE" sz="1600" dirty="0">
+                <a:solidFill>
+                  <a:srgbClr val="000000"/>
+                </a:solidFill>
+                <a:latin typeface="Source Code Pro" panose="020B0509030403020204" pitchFamily="49" charset="0"/>
+              </a:rPr>
+              <a:t> </a:t>
+            </a:r>
+            <a:r>
+              <a:rPr lang="de-DE" sz="1600" dirty="0">
+                <a:solidFill>
+                  <a:srgbClr val="464646"/>
+                </a:solidFill>
+                <a:latin typeface="Source Code Pro" panose="020B0509030403020204" pitchFamily="49" charset="0"/>
+              </a:rPr>
+              <a:t>"</a:t>
+            </a:r>
+            <a:r>
+              <a:rPr lang="de-DE" sz="1600" dirty="0" err="1">
+                <a:solidFill>
+                  <a:srgbClr val="464646"/>
+                </a:solidFill>
+                <a:latin typeface="Source Code Pro" panose="020B0509030403020204" pitchFamily="49" charset="0"/>
+              </a:rPr>
+              <a:t>string</a:t>
+            </a:r>
+            <a:r>
+              <a:rPr lang="de-DE" sz="1600" dirty="0">
+                <a:solidFill>
+                  <a:srgbClr val="464646"/>
+                </a:solidFill>
+                <a:latin typeface="Source Code Pro" panose="020B0509030403020204" pitchFamily="49" charset="0"/>
+              </a:rPr>
+              <a:t>"</a:t>
+            </a:r>
+            <a:r>
+              <a:rPr lang="de-DE" sz="1600" b="1" dirty="0">
+                <a:solidFill>
+                  <a:srgbClr val="4472C4"/>
+                </a:solidFill>
+                <a:latin typeface="Source Code Pro" panose="020B0509030403020204" pitchFamily="49" charset="0"/>
+              </a:rPr>
+              <a:t>,</a:t>
+            </a:r>
+            <a:endParaRPr lang="de-DE" sz="1600" dirty="0">
+              <a:solidFill>
+                <a:srgbClr val="000000"/>
+              </a:solidFill>
+              <a:latin typeface="Source Code Pro" panose="020B0509030403020204" pitchFamily="49" charset="0"/>
+            </a:endParaRPr>
+          </a:p>
+          <a:p>
+            <a:r>
+              <a:rPr lang="de-DE" sz="1600" dirty="0">
+                <a:solidFill>
+                  <a:srgbClr val="000000"/>
+                </a:solidFill>
+                <a:latin typeface="Source Code Pro" panose="020B0509030403020204" pitchFamily="49" charset="0"/>
+              </a:rPr>
+              <a:t>      </a:t>
+            </a:r>
+            <a:r>
+              <a:rPr lang="de-DE" sz="1600" dirty="0">
+                <a:solidFill>
+                  <a:srgbClr val="464646"/>
+                </a:solidFill>
+                <a:latin typeface="Source Code Pro" panose="020B0509030403020204" pitchFamily="49" charset="0"/>
+              </a:rPr>
+              <a:t>"</a:t>
+            </a:r>
+            <a:r>
+              <a:rPr lang="de-DE" sz="1600" dirty="0" err="1">
+                <a:solidFill>
+                  <a:srgbClr val="464646"/>
+                </a:solidFill>
+                <a:latin typeface="Source Code Pro" panose="020B0509030403020204" pitchFamily="49" charset="0"/>
+              </a:rPr>
+              <a:t>enum</a:t>
+            </a:r>
+            <a:r>
+              <a:rPr lang="de-DE" sz="1600" dirty="0">
+                <a:solidFill>
+                  <a:srgbClr val="464646"/>
+                </a:solidFill>
+                <a:latin typeface="Source Code Pro" panose="020B0509030403020204" pitchFamily="49" charset="0"/>
+              </a:rPr>
+              <a:t>"</a:t>
+            </a:r>
+            <a:r>
+              <a:rPr lang="de-DE" sz="1600" b="1" dirty="0">
+                <a:solidFill>
+                  <a:srgbClr val="4472C4"/>
+                </a:solidFill>
+                <a:latin typeface="Source Code Pro" panose="020B0509030403020204" pitchFamily="49" charset="0"/>
+              </a:rPr>
+              <a:t>:</a:t>
+            </a:r>
+            <a:r>
+              <a:rPr lang="de-DE" sz="1600" dirty="0">
+                <a:solidFill>
+                  <a:srgbClr val="000000"/>
+                </a:solidFill>
+                <a:latin typeface="Source Code Pro" panose="020B0509030403020204" pitchFamily="49" charset="0"/>
+              </a:rPr>
+              <a:t> </a:t>
+            </a:r>
+            <a:r>
+              <a:rPr lang="de-DE" sz="1600" b="1" dirty="0">
+                <a:solidFill>
+                  <a:srgbClr val="4472C4"/>
+                </a:solidFill>
+                <a:latin typeface="Source Code Pro" panose="020B0509030403020204" pitchFamily="49" charset="0"/>
+              </a:rPr>
+              <a:t>[</a:t>
+            </a:r>
+            <a:r>
+              <a:rPr lang="de-DE" sz="1600" dirty="0">
+                <a:solidFill>
+                  <a:srgbClr val="464646"/>
+                </a:solidFill>
+                <a:latin typeface="Source Code Pro" panose="020B0509030403020204" pitchFamily="49" charset="0"/>
+              </a:rPr>
+              <a:t>"Street"</a:t>
+            </a:r>
+            <a:r>
+              <a:rPr lang="de-DE" sz="1600" b="1" dirty="0">
+                <a:solidFill>
+                  <a:srgbClr val="4472C4"/>
+                </a:solidFill>
+                <a:latin typeface="Source Code Pro" panose="020B0509030403020204" pitchFamily="49" charset="0"/>
+              </a:rPr>
+              <a:t>,</a:t>
+            </a:r>
+            <a:r>
+              <a:rPr lang="de-DE" sz="1600" dirty="0">
+                <a:solidFill>
+                  <a:srgbClr val="000000"/>
+                </a:solidFill>
+                <a:latin typeface="Source Code Pro" panose="020B0509030403020204" pitchFamily="49" charset="0"/>
+              </a:rPr>
+              <a:t> </a:t>
+            </a:r>
+            <a:r>
+              <a:rPr lang="de-DE" sz="1600" dirty="0">
+                <a:solidFill>
+                  <a:srgbClr val="464646"/>
+                </a:solidFill>
+                <a:latin typeface="Source Code Pro" panose="020B0509030403020204" pitchFamily="49" charset="0"/>
+              </a:rPr>
+              <a:t>"Avenue"</a:t>
+            </a:r>
+            <a:r>
+              <a:rPr lang="de-DE" sz="1600" b="1" dirty="0">
+                <a:solidFill>
+                  <a:srgbClr val="4472C4"/>
+                </a:solidFill>
+                <a:latin typeface="Source Code Pro" panose="020B0509030403020204" pitchFamily="49" charset="0"/>
+              </a:rPr>
+              <a:t>]</a:t>
+            </a:r>
+            <a:endParaRPr lang="de-DE" sz="1600" dirty="0">
+              <a:solidFill>
+                <a:srgbClr val="000000"/>
+              </a:solidFill>
+              <a:latin typeface="Source Code Pro" panose="020B0509030403020204" pitchFamily="49" charset="0"/>
+            </a:endParaRPr>
+          </a:p>
+          <a:p>
+            <a:r>
+              <a:rPr lang="de-DE" sz="1600" dirty="0">
+                <a:solidFill>
+                  <a:srgbClr val="000000"/>
+                </a:solidFill>
+                <a:latin typeface="Source Code Pro" panose="020B0509030403020204" pitchFamily="49" charset="0"/>
+              </a:rPr>
+              <a:t>    </a:t>
+            </a:r>
+            <a:r>
+              <a:rPr lang="de-DE" sz="1600" b="1" dirty="0">
+                <a:solidFill>
+                  <a:srgbClr val="4472C4"/>
+                </a:solidFill>
+                <a:latin typeface="Source Code Pro" panose="020B0509030403020204" pitchFamily="49" charset="0"/>
+              </a:rPr>
+              <a:t>}</a:t>
+            </a:r>
+            <a:endParaRPr lang="de-DE" sz="1600" dirty="0">
+              <a:solidFill>
+                <a:srgbClr val="000000"/>
+              </a:solidFill>
+              <a:latin typeface="Source Code Pro" panose="020B0509030403020204" pitchFamily="49" charset="0"/>
+            </a:endParaRPr>
+          </a:p>
+          <a:p>
+            <a:r>
+              <a:rPr lang="de-DE" sz="1600" dirty="0">
+                <a:solidFill>
+                  <a:srgbClr val="000000"/>
+                </a:solidFill>
+                <a:latin typeface="Source Code Pro" panose="020B0509030403020204" pitchFamily="49" charset="0"/>
+              </a:rPr>
+              <a:t>  </a:t>
+            </a:r>
+            <a:r>
+              <a:rPr lang="de-DE" sz="1600" b="1" dirty="0">
+                <a:solidFill>
+                  <a:srgbClr val="4472C4"/>
+                </a:solidFill>
+                <a:latin typeface="Source Code Pro" panose="020B0509030403020204" pitchFamily="49" charset="0"/>
+              </a:rPr>
+              <a:t>]</a:t>
+            </a:r>
+            <a:endParaRPr lang="de-DE" sz="1600" dirty="0">
+              <a:solidFill>
+                <a:srgbClr val="000000"/>
+              </a:solidFill>
+              <a:latin typeface="Source Code Pro" panose="020B0509030403020204" pitchFamily="49" charset="0"/>
+            </a:endParaRPr>
+          </a:p>
+          <a:p>
+            <a:r>
+              <a:rPr lang="de-DE" sz="1600" b="1" dirty="0">
+                <a:solidFill>
+                  <a:srgbClr val="4472C4"/>
+                </a:solidFill>
+                <a:latin typeface="Source Code Pro" panose="020B0509030403020204" pitchFamily="49" charset="0"/>
+              </a:rPr>
+              <a:t>}</a:t>
+            </a:r>
+            <a:endParaRPr lang="de-DE" sz="1600" dirty="0"/>
+          </a:p>
+        </p:txBody>
+      </p:sp>
+      <p:sp>
+        <p:nvSpPr>
+          <p:cNvPr id="13" name="Rechteck 12">
+            <a:extLst>
+              <a:ext uri="{FF2B5EF4-FFF2-40B4-BE49-F238E27FC236}">
+                <a16:creationId xmlns:a16="http://schemas.microsoft.com/office/drawing/2014/main" id="{3E3051D5-59FA-4E83-B5FB-322CB6EBA24D}"/>
+              </a:ext>
+            </a:extLst>
+          </p:cNvPr>
+          <p:cNvSpPr/>
+          <p:nvPr/>
+        </p:nvSpPr>
+        <p:spPr>
+          <a:xfrm>
+            <a:off x="6744930" y="4417698"/>
+            <a:ext cx="4608870" cy="369332"/>
+          </a:xfrm>
+          <a:prstGeom prst="rect">
+            <a:avLst/>
+          </a:prstGeom>
+          <a:solidFill>
+            <a:schemeClr val="accent6">
+              <a:lumMod val="40000"/>
+              <a:lumOff val="60000"/>
+            </a:schemeClr>
+          </a:solidFill>
+          <a:ln>
+            <a:noFill/>
+          </a:ln>
+        </p:spPr>
+        <p:txBody>
+          <a:bodyPr wrap="square">
+            <a:spAutoFit/>
+          </a:bodyPr>
+          <a:lstStyle/>
+          <a:p>
+            <a:r>
+              <a:rPr lang="de-DE" b="1" dirty="0">
+                <a:solidFill>
+                  <a:srgbClr val="4472C4"/>
+                </a:solidFill>
+                <a:latin typeface="Source Code Pro" panose="020B0509030403020204" pitchFamily="49" charset="0"/>
+              </a:rPr>
+              <a:t>[</a:t>
+            </a:r>
+            <a:r>
+              <a:rPr lang="de-DE" dirty="0">
+                <a:solidFill>
+                  <a:srgbClr val="FF8000"/>
+                </a:solidFill>
+                <a:latin typeface="Source Code Pro" panose="020B0509030403020204" pitchFamily="49" charset="0"/>
+              </a:rPr>
+              <a:t>10</a:t>
+            </a:r>
+            <a:r>
+              <a:rPr lang="de-DE" b="1" dirty="0">
+                <a:solidFill>
+                  <a:srgbClr val="4472C4"/>
+                </a:solidFill>
+                <a:latin typeface="Source Code Pro" panose="020B0509030403020204" pitchFamily="49" charset="0"/>
+              </a:rPr>
+              <a:t>,</a:t>
+            </a:r>
+            <a:r>
+              <a:rPr lang="de-DE" dirty="0">
+                <a:solidFill>
+                  <a:srgbClr val="000000"/>
+                </a:solidFill>
+                <a:latin typeface="Source Code Pro" panose="020B0509030403020204" pitchFamily="49" charset="0"/>
+              </a:rPr>
+              <a:t> </a:t>
+            </a:r>
+            <a:r>
+              <a:rPr lang="de-DE" dirty="0">
+                <a:solidFill>
+                  <a:srgbClr val="464646"/>
+                </a:solidFill>
+                <a:latin typeface="Source Code Pro" panose="020B0509030403020204" pitchFamily="49" charset="0"/>
+              </a:rPr>
+              <a:t>"Street"</a:t>
+            </a:r>
+            <a:r>
+              <a:rPr lang="de-DE" b="1" dirty="0">
+                <a:solidFill>
+                  <a:srgbClr val="4472C4"/>
+                </a:solidFill>
+                <a:latin typeface="Source Code Pro" panose="020B0509030403020204" pitchFamily="49" charset="0"/>
+              </a:rPr>
+              <a:t>]</a:t>
+            </a:r>
+            <a:endParaRPr lang="de-DE" dirty="0">
+              <a:solidFill>
+                <a:srgbClr val="000000"/>
+              </a:solidFill>
+              <a:latin typeface="Source Code Pro" panose="020B0509030403020204" pitchFamily="49" charset="0"/>
+            </a:endParaRPr>
+          </a:p>
+        </p:txBody>
+      </p:sp>
+    </p:spTree>
+    <p:extLst>
+      <p:ext uri="{BB962C8B-B14F-4D97-AF65-F5344CB8AC3E}">
+        <p14:creationId xmlns:p14="http://schemas.microsoft.com/office/powerpoint/2010/main" val="2343198540"/>
+      </p:ext>
+    </p:extLst>
+  </p:cSld>
+  <p:clrMapOvr>
+    <a:masterClrMapping/>
+  </p:clrMapOvr>
+</p:sld>
+</file>
+
+<file path=ppt/slides/slide21.xml><?xml version="1.0" encoding="utf-8"?>
+<p:sld xmlns:a="http://schemas.openxmlformats.org/drawingml/2006/main" xmlns:r="http://schemas.openxmlformats.org/officeDocument/2006/relationships" xmlns:p="http://schemas.openxmlformats.org/presentationml/2006/main">
+  <p:cSld>
+    <p:spTree>
+      <p:nvGrpSpPr>
+        <p:cNvPr id="1" name=""/>
+        <p:cNvGrpSpPr/>
+        <p:nvPr/>
+      </p:nvGrpSpPr>
+      <p:grpSpPr>
+        <a:xfrm>
+          <a:off x="0" y="0"/>
+          <a:ext cx="0" cy="0"/>
+          <a:chOff x="0" y="0"/>
+          <a:chExt cx="0" cy="0"/>
+        </a:xfrm>
+      </p:grpSpPr>
+      <p:sp>
+        <p:nvSpPr>
+          <p:cNvPr id="2" name="Titel 1">
+            <a:extLst>
+              <a:ext uri="{FF2B5EF4-FFF2-40B4-BE49-F238E27FC236}">
+                <a16:creationId xmlns:a16="http://schemas.microsoft.com/office/drawing/2014/main" id="{263B568C-3395-4B3C-80D7-E8AF938BCCCC}"/>
+              </a:ext>
+            </a:extLst>
+          </p:cNvPr>
+          <p:cNvSpPr>
+            <a:spLocks noGrp="1"/>
+          </p:cNvSpPr>
+          <p:nvPr>
+            <p:ph type="title"/>
+          </p:nvPr>
+        </p:nvSpPr>
+        <p:spPr/>
+        <p:txBody>
+          <a:bodyPr/>
+          <a:lstStyle/>
+          <a:p>
+            <a:r>
+              <a:rPr lang="de-DE" dirty="0"/>
+              <a:t>Arrays (3/3)</a:t>
+            </a:r>
+          </a:p>
+        </p:txBody>
+      </p:sp>
+      <p:sp>
+        <p:nvSpPr>
+          <p:cNvPr id="3" name="Inhaltsplatzhalter 2">
+            <a:extLst>
+              <a:ext uri="{FF2B5EF4-FFF2-40B4-BE49-F238E27FC236}">
+                <a16:creationId xmlns:a16="http://schemas.microsoft.com/office/drawing/2014/main" id="{CBF494EF-36B2-44DD-92ED-0034DFBAA22F}"/>
+              </a:ext>
+            </a:extLst>
+          </p:cNvPr>
+          <p:cNvSpPr>
+            <a:spLocks noGrp="1"/>
+          </p:cNvSpPr>
+          <p:nvPr>
+            <p:ph idx="1"/>
+          </p:nvPr>
+        </p:nvSpPr>
+        <p:spPr>
+          <a:xfrm>
+            <a:off x="838200" y="1825625"/>
+            <a:ext cx="10515600" cy="4351338"/>
+          </a:xfrm>
+        </p:spPr>
+        <p:txBody>
+          <a:bodyPr/>
+          <a:lstStyle/>
+          <a:p>
+            <a:r>
+              <a:rPr lang="de-DE" dirty="0"/>
+              <a:t>Prüfung auf Länge mit </a:t>
+            </a:r>
+            <a:r>
+              <a:rPr lang="de-DE" dirty="0" err="1"/>
+              <a:t>minItems</a:t>
+            </a:r>
+            <a:r>
+              <a:rPr lang="de-DE" dirty="0"/>
+              <a:t>/</a:t>
+            </a:r>
+            <a:r>
+              <a:rPr lang="de-DE" dirty="0" err="1"/>
+              <a:t>maxItems</a:t>
+            </a:r>
+            <a:endParaRPr lang="de-DE" dirty="0"/>
+          </a:p>
+          <a:p>
+            <a:endParaRPr lang="de-DE" dirty="0"/>
+          </a:p>
+          <a:p>
+            <a:endParaRPr lang="de-DE" dirty="0"/>
+          </a:p>
+          <a:p>
+            <a:pPr marL="0" indent="0">
+              <a:buNone/>
+            </a:pPr>
+            <a:endParaRPr lang="de-DE" dirty="0"/>
+          </a:p>
+          <a:p>
+            <a:r>
+              <a:rPr lang="de-DE" dirty="0"/>
+              <a:t>Prüfung auf Einzigartigkeit</a:t>
+            </a:r>
+          </a:p>
+        </p:txBody>
+      </p:sp>
+      <p:sp>
+        <p:nvSpPr>
+          <p:cNvPr id="4" name="Datumsplatzhalter 3">
+            <a:extLst>
+              <a:ext uri="{FF2B5EF4-FFF2-40B4-BE49-F238E27FC236}">
+                <a16:creationId xmlns:a16="http://schemas.microsoft.com/office/drawing/2014/main" id="{25837733-F8B3-4C3E-A803-5F05F95FB3DC}"/>
+              </a:ext>
+            </a:extLst>
+          </p:cNvPr>
+          <p:cNvSpPr>
+            <a:spLocks noGrp="1"/>
+          </p:cNvSpPr>
+          <p:nvPr>
+            <p:ph type="dt" sz="half" idx="10"/>
+          </p:nvPr>
+        </p:nvSpPr>
+        <p:spPr/>
+        <p:txBody>
+          <a:bodyPr/>
+          <a:lstStyle/>
+          <a:p>
+            <a:fld id="{CFFA1D88-5C5F-47BF-8575-62828799C3D3}" type="datetime1">
+              <a:rPr lang="de-DE" smtClean="0"/>
+              <a:t>10.12.2017</a:t>
+            </a:fld>
+            <a:endParaRPr lang="de-DE" dirty="0"/>
+          </a:p>
+        </p:txBody>
+      </p:sp>
+      <p:sp>
+        <p:nvSpPr>
+          <p:cNvPr id="5" name="Fußzeilenplatzhalter 4">
+            <a:extLst>
+              <a:ext uri="{FF2B5EF4-FFF2-40B4-BE49-F238E27FC236}">
+                <a16:creationId xmlns:a16="http://schemas.microsoft.com/office/drawing/2014/main" id="{37F17228-D4D8-4BBB-A244-7340EF0FE22B}"/>
+              </a:ext>
+            </a:extLst>
+          </p:cNvPr>
+          <p:cNvSpPr>
+            <a:spLocks noGrp="1"/>
+          </p:cNvSpPr>
+          <p:nvPr>
+            <p:ph type="ftr" sz="quarter" idx="11"/>
+          </p:nvPr>
+        </p:nvSpPr>
+        <p:spPr/>
+        <p:txBody>
+          <a:bodyPr/>
+          <a:lstStyle/>
+          <a:p>
+            <a:r>
+              <a:rPr lang="de-DE"/>
+              <a:t>Daniel Flasch</a:t>
+            </a:r>
+            <a:endParaRPr lang="de-DE" dirty="0"/>
+          </a:p>
+        </p:txBody>
+      </p:sp>
+      <p:sp>
+        <p:nvSpPr>
+          <p:cNvPr id="6" name="Foliennummernplatzhalter 5">
+            <a:extLst>
+              <a:ext uri="{FF2B5EF4-FFF2-40B4-BE49-F238E27FC236}">
+                <a16:creationId xmlns:a16="http://schemas.microsoft.com/office/drawing/2014/main" id="{0A3B9615-9A42-4020-ABBE-BFFD4333625F}"/>
+              </a:ext>
+            </a:extLst>
+          </p:cNvPr>
+          <p:cNvSpPr>
+            <a:spLocks noGrp="1"/>
+          </p:cNvSpPr>
+          <p:nvPr>
+            <p:ph type="sldNum" sz="quarter" idx="12"/>
+          </p:nvPr>
+        </p:nvSpPr>
+        <p:spPr/>
+        <p:txBody>
+          <a:bodyPr/>
+          <a:lstStyle/>
+          <a:p>
+            <a:fld id="{4DEAFF03-B2A3-4F10-AFBA-713F9B73CAA7}" type="slidenum">
+              <a:rPr lang="de-DE" smtClean="0"/>
+              <a:t>20</a:t>
+            </a:fld>
+            <a:endParaRPr lang="de-DE"/>
+          </a:p>
+        </p:txBody>
+      </p:sp>
+      <p:sp>
+        <p:nvSpPr>
+          <p:cNvPr id="9" name="Rechteck 8">
+            <a:extLst>
+              <a:ext uri="{FF2B5EF4-FFF2-40B4-BE49-F238E27FC236}">
+                <a16:creationId xmlns:a16="http://schemas.microsoft.com/office/drawing/2014/main" id="{D53069BA-2455-49E1-8360-B8F571081120}"/>
+              </a:ext>
+            </a:extLst>
+          </p:cNvPr>
+          <p:cNvSpPr/>
+          <p:nvPr/>
+        </p:nvSpPr>
+        <p:spPr>
+          <a:xfrm>
+            <a:off x="6744930" y="2466719"/>
+            <a:ext cx="4608870" cy="369332"/>
+          </a:xfrm>
+          <a:prstGeom prst="rect">
+            <a:avLst/>
+          </a:prstGeom>
+          <a:solidFill>
+            <a:srgbClr val="FFCCCC"/>
+          </a:solidFill>
+          <a:ln>
+            <a:noFill/>
+          </a:ln>
+        </p:spPr>
+        <p:txBody>
+          <a:bodyPr wrap="square">
+            <a:spAutoFit/>
+          </a:bodyPr>
+          <a:lstStyle/>
+          <a:p>
+            <a:r>
+              <a:rPr lang="de-DE" b="1" dirty="0">
+                <a:solidFill>
+                  <a:srgbClr val="4472C4"/>
+                </a:solidFill>
+                <a:latin typeface="Source Code Pro" panose="020B0509030403020204" pitchFamily="49" charset="0"/>
+              </a:rPr>
+              <a:t>[</a:t>
+            </a:r>
+            <a:r>
+              <a:rPr lang="de-DE" dirty="0">
+                <a:solidFill>
+                  <a:srgbClr val="464646"/>
+                </a:solidFill>
+                <a:latin typeface="Source Code Pro" panose="020B0509030403020204" pitchFamily="49" charset="0"/>
+              </a:rPr>
+              <a:t>"Street"</a:t>
+            </a:r>
+            <a:r>
+              <a:rPr lang="de-DE" b="1" dirty="0">
+                <a:solidFill>
+                  <a:srgbClr val="4472C4"/>
+                </a:solidFill>
+                <a:latin typeface="Source Code Pro" panose="020B0509030403020204" pitchFamily="49" charset="0"/>
+              </a:rPr>
+              <a:t>]</a:t>
+            </a:r>
+            <a:endParaRPr lang="de-DE" dirty="0"/>
+          </a:p>
+        </p:txBody>
+      </p:sp>
+      <p:sp>
+        <p:nvSpPr>
+          <p:cNvPr id="7" name="Rechteck 6">
+            <a:extLst>
+              <a:ext uri="{FF2B5EF4-FFF2-40B4-BE49-F238E27FC236}">
+                <a16:creationId xmlns:a16="http://schemas.microsoft.com/office/drawing/2014/main" id="{D82A133D-574A-4D69-B0F6-84CE3623EFA0}"/>
+              </a:ext>
+            </a:extLst>
+          </p:cNvPr>
+          <p:cNvSpPr/>
+          <p:nvPr/>
+        </p:nvSpPr>
+        <p:spPr>
+          <a:xfrm>
+            <a:off x="1112240" y="2397948"/>
+            <a:ext cx="4983760" cy="1323439"/>
+          </a:xfrm>
+          <a:prstGeom prst="rect">
+            <a:avLst/>
+          </a:prstGeom>
+          <a:solidFill>
+            <a:schemeClr val="bg1">
+              <a:lumMod val="95000"/>
+            </a:schemeClr>
+          </a:solidFill>
+          <a:ln>
+            <a:solidFill>
+              <a:schemeClr val="bg1">
+                <a:lumMod val="85000"/>
+              </a:schemeClr>
+            </a:solidFill>
+          </a:ln>
+        </p:spPr>
+        <p:txBody>
+          <a:bodyPr wrap="square">
+            <a:spAutoFit/>
+          </a:bodyPr>
+          <a:lstStyle/>
+          <a:p>
+            <a:r>
+              <a:rPr lang="de-DE" sz="1600" b="1" dirty="0">
+                <a:solidFill>
+                  <a:srgbClr val="4472C4"/>
+                </a:solidFill>
+                <a:latin typeface="Source Code Pro" panose="020B0509030403020204" pitchFamily="49" charset="0"/>
+              </a:rPr>
+              <a:t>{</a:t>
+            </a:r>
+            <a:endParaRPr lang="de-DE" sz="1600" dirty="0">
+              <a:solidFill>
+                <a:srgbClr val="000000"/>
+              </a:solidFill>
+              <a:latin typeface="Source Code Pro" panose="020B0509030403020204" pitchFamily="49" charset="0"/>
+            </a:endParaRPr>
+          </a:p>
+          <a:p>
+            <a:r>
+              <a:rPr lang="de-DE" sz="1600" dirty="0">
+                <a:solidFill>
+                  <a:srgbClr val="000000"/>
+                </a:solidFill>
+                <a:latin typeface="Source Code Pro" panose="020B0509030403020204" pitchFamily="49" charset="0"/>
+              </a:rPr>
+              <a:t>  </a:t>
+            </a:r>
+            <a:r>
+              <a:rPr lang="de-DE" sz="1600" dirty="0">
+                <a:solidFill>
+                  <a:srgbClr val="464646"/>
+                </a:solidFill>
+                <a:latin typeface="Source Code Pro" panose="020B0509030403020204" pitchFamily="49" charset="0"/>
+              </a:rPr>
+              <a:t>"type"</a:t>
+            </a:r>
+            <a:r>
+              <a:rPr lang="de-DE" sz="1600" b="1" dirty="0">
+                <a:solidFill>
+                  <a:srgbClr val="4472C4"/>
+                </a:solidFill>
+                <a:latin typeface="Source Code Pro" panose="020B0509030403020204" pitchFamily="49" charset="0"/>
+              </a:rPr>
+              <a:t>:</a:t>
+            </a:r>
+            <a:r>
+              <a:rPr lang="de-DE" sz="1600" dirty="0">
+                <a:solidFill>
+                  <a:srgbClr val="000000"/>
+                </a:solidFill>
+                <a:latin typeface="Source Code Pro" panose="020B0509030403020204" pitchFamily="49" charset="0"/>
+              </a:rPr>
+              <a:t> </a:t>
+            </a:r>
+            <a:r>
+              <a:rPr lang="de-DE" sz="1600" dirty="0">
+                <a:solidFill>
+                  <a:srgbClr val="464646"/>
+                </a:solidFill>
+                <a:latin typeface="Source Code Pro" panose="020B0509030403020204" pitchFamily="49" charset="0"/>
+              </a:rPr>
+              <a:t>"</a:t>
+            </a:r>
+            <a:r>
+              <a:rPr lang="de-DE" sz="1600" dirty="0" err="1">
+                <a:solidFill>
+                  <a:srgbClr val="464646"/>
+                </a:solidFill>
+                <a:latin typeface="Source Code Pro" panose="020B0509030403020204" pitchFamily="49" charset="0"/>
+              </a:rPr>
+              <a:t>array</a:t>
+            </a:r>
+            <a:r>
+              <a:rPr lang="de-DE" sz="1600" dirty="0">
+                <a:solidFill>
+                  <a:srgbClr val="464646"/>
+                </a:solidFill>
+                <a:latin typeface="Source Code Pro" panose="020B0509030403020204" pitchFamily="49" charset="0"/>
+              </a:rPr>
+              <a:t>"</a:t>
+            </a:r>
+            <a:r>
+              <a:rPr lang="de-DE" sz="1600" b="1" dirty="0">
+                <a:solidFill>
+                  <a:srgbClr val="4472C4"/>
+                </a:solidFill>
+                <a:latin typeface="Source Code Pro" panose="020B0509030403020204" pitchFamily="49" charset="0"/>
+              </a:rPr>
+              <a:t>,</a:t>
+            </a:r>
+            <a:endParaRPr lang="de-DE" sz="1600" dirty="0">
+              <a:solidFill>
+                <a:srgbClr val="000000"/>
+              </a:solidFill>
+              <a:latin typeface="Source Code Pro" panose="020B0509030403020204" pitchFamily="49" charset="0"/>
+            </a:endParaRPr>
+          </a:p>
+          <a:p>
+            <a:r>
+              <a:rPr lang="de-DE" sz="1600" dirty="0">
+                <a:solidFill>
+                  <a:srgbClr val="000000"/>
+                </a:solidFill>
+                <a:latin typeface="Source Code Pro" panose="020B0509030403020204" pitchFamily="49" charset="0"/>
+              </a:rPr>
+              <a:t>  </a:t>
+            </a:r>
+            <a:r>
+              <a:rPr lang="de-DE" sz="1600" dirty="0">
+                <a:solidFill>
+                  <a:srgbClr val="464646"/>
+                </a:solidFill>
+                <a:latin typeface="Source Code Pro" panose="020B0509030403020204" pitchFamily="49" charset="0"/>
+              </a:rPr>
+              <a:t>"</a:t>
+            </a:r>
+            <a:r>
+              <a:rPr lang="de-DE" sz="1600" dirty="0" err="1">
+                <a:solidFill>
+                  <a:srgbClr val="464646"/>
+                </a:solidFill>
+                <a:latin typeface="Source Code Pro" panose="020B0509030403020204" pitchFamily="49" charset="0"/>
+              </a:rPr>
+              <a:t>minItems</a:t>
+            </a:r>
+            <a:r>
+              <a:rPr lang="de-DE" sz="1600" dirty="0">
+                <a:solidFill>
+                  <a:srgbClr val="464646"/>
+                </a:solidFill>
+                <a:latin typeface="Source Code Pro" panose="020B0509030403020204" pitchFamily="49" charset="0"/>
+              </a:rPr>
+              <a:t>"</a:t>
+            </a:r>
+            <a:r>
+              <a:rPr lang="de-DE" sz="1600" b="1" dirty="0">
+                <a:solidFill>
+                  <a:srgbClr val="4472C4"/>
+                </a:solidFill>
+                <a:latin typeface="Source Code Pro" panose="020B0509030403020204" pitchFamily="49" charset="0"/>
+              </a:rPr>
+              <a:t>:</a:t>
+            </a:r>
+            <a:r>
+              <a:rPr lang="de-DE" sz="1600" dirty="0">
+                <a:solidFill>
+                  <a:srgbClr val="000000"/>
+                </a:solidFill>
+                <a:latin typeface="Source Code Pro" panose="020B0509030403020204" pitchFamily="49" charset="0"/>
+              </a:rPr>
+              <a:t> </a:t>
+            </a:r>
+            <a:r>
+              <a:rPr lang="de-DE" sz="1600" dirty="0">
+                <a:solidFill>
+                  <a:srgbClr val="FF8000"/>
+                </a:solidFill>
+                <a:latin typeface="Source Code Pro" panose="020B0509030403020204" pitchFamily="49" charset="0"/>
+              </a:rPr>
+              <a:t>2</a:t>
+            </a:r>
+            <a:r>
+              <a:rPr lang="de-DE" sz="1600" b="1" dirty="0">
+                <a:solidFill>
+                  <a:srgbClr val="4472C4"/>
+                </a:solidFill>
+                <a:latin typeface="Source Code Pro" panose="020B0509030403020204" pitchFamily="49" charset="0"/>
+              </a:rPr>
+              <a:t>,</a:t>
+            </a:r>
+            <a:endParaRPr lang="de-DE" sz="1600" dirty="0">
+              <a:solidFill>
+                <a:srgbClr val="000000"/>
+              </a:solidFill>
+              <a:latin typeface="Source Code Pro" panose="020B0509030403020204" pitchFamily="49" charset="0"/>
+            </a:endParaRPr>
+          </a:p>
+          <a:p>
+            <a:r>
+              <a:rPr lang="de-DE" sz="1600" dirty="0">
+                <a:solidFill>
+                  <a:srgbClr val="000000"/>
+                </a:solidFill>
+                <a:latin typeface="Source Code Pro" panose="020B0509030403020204" pitchFamily="49" charset="0"/>
+              </a:rPr>
+              <a:t>  </a:t>
+            </a:r>
+            <a:r>
+              <a:rPr lang="de-DE" sz="1600" dirty="0">
+                <a:solidFill>
+                  <a:srgbClr val="464646"/>
+                </a:solidFill>
+                <a:latin typeface="Source Code Pro" panose="020B0509030403020204" pitchFamily="49" charset="0"/>
+              </a:rPr>
+              <a:t>"</a:t>
+            </a:r>
+            <a:r>
+              <a:rPr lang="de-DE" sz="1600" dirty="0" err="1">
+                <a:solidFill>
+                  <a:srgbClr val="464646"/>
+                </a:solidFill>
+                <a:latin typeface="Source Code Pro" panose="020B0509030403020204" pitchFamily="49" charset="0"/>
+              </a:rPr>
+              <a:t>maxItems</a:t>
+            </a:r>
+            <a:r>
+              <a:rPr lang="de-DE" sz="1600" dirty="0">
+                <a:solidFill>
+                  <a:srgbClr val="464646"/>
+                </a:solidFill>
+                <a:latin typeface="Source Code Pro" panose="020B0509030403020204" pitchFamily="49" charset="0"/>
+              </a:rPr>
+              <a:t>"</a:t>
+            </a:r>
+            <a:r>
+              <a:rPr lang="de-DE" sz="1600" b="1" dirty="0">
+                <a:solidFill>
+                  <a:srgbClr val="4472C4"/>
+                </a:solidFill>
+                <a:latin typeface="Source Code Pro" panose="020B0509030403020204" pitchFamily="49" charset="0"/>
+              </a:rPr>
+              <a:t>:</a:t>
+            </a:r>
+            <a:r>
+              <a:rPr lang="de-DE" sz="1600" dirty="0">
+                <a:solidFill>
+                  <a:srgbClr val="000000"/>
+                </a:solidFill>
+                <a:latin typeface="Source Code Pro" panose="020B0509030403020204" pitchFamily="49" charset="0"/>
+              </a:rPr>
+              <a:t> </a:t>
+            </a:r>
+            <a:r>
+              <a:rPr lang="de-DE" sz="1600" dirty="0">
+                <a:solidFill>
+                  <a:srgbClr val="FF8000"/>
+                </a:solidFill>
+                <a:latin typeface="Source Code Pro" panose="020B0509030403020204" pitchFamily="49" charset="0"/>
+              </a:rPr>
+              <a:t>3</a:t>
+            </a:r>
+            <a:endParaRPr lang="de-DE" sz="1600" dirty="0">
+              <a:solidFill>
+                <a:srgbClr val="000000"/>
+              </a:solidFill>
+              <a:latin typeface="Source Code Pro" panose="020B0509030403020204" pitchFamily="49" charset="0"/>
+            </a:endParaRPr>
+          </a:p>
+          <a:p>
+            <a:r>
+              <a:rPr lang="de-DE" sz="1600" b="1" dirty="0">
+                <a:solidFill>
+                  <a:srgbClr val="4472C4"/>
+                </a:solidFill>
+                <a:latin typeface="Source Code Pro" panose="020B0509030403020204" pitchFamily="49" charset="0"/>
+              </a:rPr>
+              <a:t>}</a:t>
+            </a:r>
+            <a:endParaRPr lang="de-DE" sz="1600" dirty="0"/>
+          </a:p>
+        </p:txBody>
+      </p:sp>
+      <p:sp>
+        <p:nvSpPr>
+          <p:cNvPr id="13" name="Rechteck 12">
+            <a:extLst>
+              <a:ext uri="{FF2B5EF4-FFF2-40B4-BE49-F238E27FC236}">
+                <a16:creationId xmlns:a16="http://schemas.microsoft.com/office/drawing/2014/main" id="{3E3051D5-59FA-4E83-B5FB-322CB6EBA24D}"/>
+              </a:ext>
+            </a:extLst>
+          </p:cNvPr>
+          <p:cNvSpPr/>
+          <p:nvPr/>
+        </p:nvSpPr>
+        <p:spPr>
+          <a:xfrm>
+            <a:off x="6744930" y="2873484"/>
+            <a:ext cx="4608870" cy="369332"/>
+          </a:xfrm>
+          <a:prstGeom prst="rect">
+            <a:avLst/>
+          </a:prstGeom>
+          <a:solidFill>
+            <a:schemeClr val="accent6">
+              <a:lumMod val="40000"/>
+              <a:lumOff val="60000"/>
+            </a:schemeClr>
+          </a:solidFill>
+          <a:ln>
+            <a:noFill/>
+          </a:ln>
+        </p:spPr>
+        <p:txBody>
+          <a:bodyPr wrap="square">
+            <a:spAutoFit/>
+          </a:bodyPr>
+          <a:lstStyle/>
+          <a:p>
+            <a:r>
+              <a:rPr lang="de-DE" b="1" dirty="0">
+                <a:solidFill>
+                  <a:srgbClr val="4472C4"/>
+                </a:solidFill>
+                <a:latin typeface="Source Code Pro" panose="020B0509030403020204" pitchFamily="49" charset="0"/>
+              </a:rPr>
+              <a:t>[</a:t>
+            </a:r>
+            <a:r>
+              <a:rPr lang="de-DE" dirty="0">
+                <a:solidFill>
+                  <a:srgbClr val="FF8000"/>
+                </a:solidFill>
+                <a:latin typeface="Source Code Pro" panose="020B0509030403020204" pitchFamily="49" charset="0"/>
+              </a:rPr>
+              <a:t>10</a:t>
+            </a:r>
+            <a:r>
+              <a:rPr lang="de-DE" b="1" dirty="0">
+                <a:solidFill>
+                  <a:srgbClr val="4472C4"/>
+                </a:solidFill>
+                <a:latin typeface="Source Code Pro" panose="020B0509030403020204" pitchFamily="49" charset="0"/>
+              </a:rPr>
+              <a:t>,</a:t>
+            </a:r>
+            <a:r>
+              <a:rPr lang="de-DE" dirty="0">
+                <a:solidFill>
+                  <a:srgbClr val="000000"/>
+                </a:solidFill>
+                <a:latin typeface="Source Code Pro" panose="020B0509030403020204" pitchFamily="49" charset="0"/>
+              </a:rPr>
+              <a:t> </a:t>
+            </a:r>
+            <a:r>
+              <a:rPr lang="de-DE" dirty="0">
+                <a:solidFill>
+                  <a:srgbClr val="464646"/>
+                </a:solidFill>
+                <a:latin typeface="Source Code Pro" panose="020B0509030403020204" pitchFamily="49" charset="0"/>
+              </a:rPr>
+              <a:t>"Street"</a:t>
+            </a:r>
+            <a:r>
+              <a:rPr lang="de-DE" b="1" dirty="0">
+                <a:solidFill>
+                  <a:srgbClr val="4472C4"/>
+                </a:solidFill>
+                <a:latin typeface="Source Code Pro" panose="020B0509030403020204" pitchFamily="49" charset="0"/>
+              </a:rPr>
+              <a:t>]</a:t>
+            </a:r>
+            <a:endParaRPr lang="de-DE" dirty="0">
+              <a:solidFill>
+                <a:srgbClr val="000000"/>
+              </a:solidFill>
+              <a:latin typeface="Source Code Pro" panose="020B0509030403020204" pitchFamily="49" charset="0"/>
+            </a:endParaRPr>
+          </a:p>
+        </p:txBody>
+      </p:sp>
+      <p:sp>
+        <p:nvSpPr>
+          <p:cNvPr id="14" name="Rechteck 13">
+            <a:extLst>
+              <a:ext uri="{FF2B5EF4-FFF2-40B4-BE49-F238E27FC236}">
+                <a16:creationId xmlns:a16="http://schemas.microsoft.com/office/drawing/2014/main" id="{865D7748-148C-4D02-84CA-696B29B83942}"/>
+              </a:ext>
+            </a:extLst>
+          </p:cNvPr>
+          <p:cNvSpPr/>
+          <p:nvPr/>
+        </p:nvSpPr>
+        <p:spPr>
+          <a:xfrm>
+            <a:off x="6744930" y="3287798"/>
+            <a:ext cx="4608870" cy="369332"/>
+          </a:xfrm>
+          <a:prstGeom prst="rect">
+            <a:avLst/>
+          </a:prstGeom>
+          <a:solidFill>
+            <a:schemeClr val="accent6">
+              <a:lumMod val="40000"/>
+              <a:lumOff val="60000"/>
+            </a:schemeClr>
+          </a:solidFill>
+          <a:ln>
+            <a:noFill/>
+          </a:ln>
+        </p:spPr>
+        <p:txBody>
+          <a:bodyPr wrap="square">
+            <a:spAutoFit/>
+          </a:bodyPr>
+          <a:lstStyle/>
+          <a:p>
+            <a:r>
+              <a:rPr lang="de-DE" b="1" dirty="0">
+                <a:solidFill>
+                  <a:srgbClr val="4472C4"/>
+                </a:solidFill>
+                <a:latin typeface="Source Code Pro" panose="020B0509030403020204" pitchFamily="49" charset="0"/>
+              </a:rPr>
+              <a:t>[</a:t>
+            </a:r>
+            <a:r>
+              <a:rPr lang="de-DE" dirty="0">
+                <a:solidFill>
+                  <a:srgbClr val="FF8000"/>
+                </a:solidFill>
+                <a:latin typeface="Source Code Pro" panose="020B0509030403020204" pitchFamily="49" charset="0"/>
+              </a:rPr>
+              <a:t>24</a:t>
+            </a:r>
+            <a:r>
+              <a:rPr lang="de-DE" b="1" dirty="0">
+                <a:solidFill>
+                  <a:srgbClr val="4472C4"/>
+                </a:solidFill>
+                <a:latin typeface="Source Code Pro" panose="020B0509030403020204" pitchFamily="49" charset="0"/>
+              </a:rPr>
+              <a:t>,</a:t>
+            </a:r>
+            <a:r>
+              <a:rPr lang="de-DE" dirty="0">
+                <a:solidFill>
+                  <a:srgbClr val="000000"/>
+                </a:solidFill>
+                <a:latin typeface="Source Code Pro" panose="020B0509030403020204" pitchFamily="49" charset="0"/>
+              </a:rPr>
+              <a:t> </a:t>
+            </a:r>
+            <a:r>
+              <a:rPr lang="de-DE" dirty="0">
+                <a:solidFill>
+                  <a:srgbClr val="464646"/>
+                </a:solidFill>
+                <a:latin typeface="Source Code Pro" panose="020B0509030403020204" pitchFamily="49" charset="0"/>
+              </a:rPr>
+              <a:t>"Sussex"</a:t>
+            </a:r>
+            <a:r>
+              <a:rPr lang="de-DE" b="1" dirty="0">
+                <a:solidFill>
+                  <a:srgbClr val="4472C4"/>
+                </a:solidFill>
+                <a:latin typeface="Source Code Pro" panose="020B0509030403020204" pitchFamily="49" charset="0"/>
+              </a:rPr>
+              <a:t>,</a:t>
+            </a:r>
+            <a:r>
+              <a:rPr lang="de-DE" dirty="0">
+                <a:solidFill>
+                  <a:srgbClr val="000000"/>
+                </a:solidFill>
+                <a:latin typeface="Source Code Pro" panose="020B0509030403020204" pitchFamily="49" charset="0"/>
+              </a:rPr>
+              <a:t> </a:t>
+            </a:r>
+            <a:r>
+              <a:rPr lang="de-DE" dirty="0">
+                <a:solidFill>
+                  <a:srgbClr val="464646"/>
+                </a:solidFill>
+                <a:latin typeface="Source Code Pro" panose="020B0509030403020204" pitchFamily="49" charset="0"/>
+              </a:rPr>
+              <a:t>"Drive"</a:t>
+            </a:r>
+            <a:r>
+              <a:rPr lang="de-DE" b="1" dirty="0">
+                <a:solidFill>
+                  <a:srgbClr val="4472C4"/>
+                </a:solidFill>
+                <a:latin typeface="Source Code Pro" panose="020B0509030403020204" pitchFamily="49" charset="0"/>
+              </a:rPr>
+              <a:t>]</a:t>
+            </a:r>
+            <a:endParaRPr lang="de-DE" dirty="0">
+              <a:solidFill>
+                <a:srgbClr val="000000"/>
+              </a:solidFill>
+              <a:latin typeface="Source Code Pro" panose="020B0509030403020204" pitchFamily="49" charset="0"/>
+            </a:endParaRPr>
+          </a:p>
+        </p:txBody>
+      </p:sp>
+      <p:sp>
+        <p:nvSpPr>
+          <p:cNvPr id="11" name="Rechteck 10">
+            <a:extLst>
+              <a:ext uri="{FF2B5EF4-FFF2-40B4-BE49-F238E27FC236}">
+                <a16:creationId xmlns:a16="http://schemas.microsoft.com/office/drawing/2014/main" id="{1CE1AA02-D28F-4821-A651-839CEA7BC8AE}"/>
+              </a:ext>
+            </a:extLst>
+          </p:cNvPr>
+          <p:cNvSpPr/>
+          <p:nvPr/>
+        </p:nvSpPr>
+        <p:spPr>
+          <a:xfrm>
+            <a:off x="1112240" y="4466163"/>
+            <a:ext cx="4983760" cy="1200329"/>
+          </a:xfrm>
+          <a:prstGeom prst="rect">
+            <a:avLst/>
+          </a:prstGeom>
+          <a:solidFill>
+            <a:schemeClr val="bg1">
+              <a:lumMod val="95000"/>
+            </a:schemeClr>
+          </a:solidFill>
+          <a:ln>
+            <a:solidFill>
+              <a:schemeClr val="bg1">
+                <a:lumMod val="85000"/>
+              </a:schemeClr>
+            </a:solidFill>
+          </a:ln>
+        </p:spPr>
+        <p:txBody>
+          <a:bodyPr wrap="square">
+            <a:spAutoFit/>
+          </a:bodyPr>
+          <a:lstStyle/>
+          <a:p>
+            <a:r>
+              <a:rPr lang="de-DE" b="1" dirty="0">
+                <a:solidFill>
+                  <a:srgbClr val="4472C4"/>
+                </a:solidFill>
+                <a:latin typeface="Source Code Pro" panose="020B0509030403020204" pitchFamily="49" charset="0"/>
+              </a:rPr>
+              <a:t>{</a:t>
+            </a:r>
+            <a:endParaRPr lang="de-DE" dirty="0">
+              <a:solidFill>
+                <a:srgbClr val="000000"/>
+              </a:solidFill>
+              <a:latin typeface="Source Code Pro" panose="020B0509030403020204" pitchFamily="49" charset="0"/>
+            </a:endParaRPr>
+          </a:p>
+          <a:p>
+            <a:r>
+              <a:rPr lang="de-DE" dirty="0">
+                <a:solidFill>
+                  <a:srgbClr val="000000"/>
+                </a:solidFill>
+                <a:latin typeface="Source Code Pro" panose="020B0509030403020204" pitchFamily="49" charset="0"/>
+              </a:rPr>
+              <a:t>  </a:t>
+            </a:r>
+            <a:r>
+              <a:rPr lang="de-DE" dirty="0">
+                <a:solidFill>
+                  <a:srgbClr val="464646"/>
+                </a:solidFill>
+                <a:latin typeface="Source Code Pro" panose="020B0509030403020204" pitchFamily="49" charset="0"/>
+              </a:rPr>
+              <a:t>"type"</a:t>
+            </a:r>
+            <a:r>
+              <a:rPr lang="de-DE" b="1" dirty="0">
+                <a:solidFill>
+                  <a:srgbClr val="4472C4"/>
+                </a:solidFill>
+                <a:latin typeface="Source Code Pro" panose="020B0509030403020204" pitchFamily="49" charset="0"/>
+              </a:rPr>
+              <a:t>:</a:t>
+            </a:r>
+            <a:r>
+              <a:rPr lang="de-DE" dirty="0">
+                <a:solidFill>
+                  <a:srgbClr val="000000"/>
+                </a:solidFill>
+                <a:latin typeface="Source Code Pro" panose="020B0509030403020204" pitchFamily="49" charset="0"/>
+              </a:rPr>
+              <a:t> </a:t>
+            </a:r>
+            <a:r>
+              <a:rPr lang="de-DE" dirty="0">
+                <a:solidFill>
+                  <a:srgbClr val="464646"/>
+                </a:solidFill>
+                <a:latin typeface="Source Code Pro" panose="020B0509030403020204" pitchFamily="49" charset="0"/>
+              </a:rPr>
+              <a:t>"</a:t>
+            </a:r>
+            <a:r>
+              <a:rPr lang="de-DE" dirty="0" err="1">
+                <a:solidFill>
+                  <a:srgbClr val="464646"/>
+                </a:solidFill>
+                <a:latin typeface="Source Code Pro" panose="020B0509030403020204" pitchFamily="49" charset="0"/>
+              </a:rPr>
+              <a:t>array</a:t>
+            </a:r>
+            <a:r>
+              <a:rPr lang="de-DE" dirty="0">
+                <a:solidFill>
+                  <a:srgbClr val="464646"/>
+                </a:solidFill>
+                <a:latin typeface="Source Code Pro" panose="020B0509030403020204" pitchFamily="49" charset="0"/>
+              </a:rPr>
+              <a:t>"</a:t>
+            </a:r>
+            <a:r>
+              <a:rPr lang="de-DE" b="1" dirty="0">
+                <a:solidFill>
+                  <a:srgbClr val="4472C4"/>
+                </a:solidFill>
+                <a:latin typeface="Source Code Pro" panose="020B0509030403020204" pitchFamily="49" charset="0"/>
+              </a:rPr>
+              <a:t>,</a:t>
+            </a:r>
+            <a:endParaRPr lang="de-DE" dirty="0">
+              <a:solidFill>
+                <a:srgbClr val="000000"/>
+              </a:solidFill>
+              <a:latin typeface="Source Code Pro" panose="020B0509030403020204" pitchFamily="49" charset="0"/>
+            </a:endParaRPr>
+          </a:p>
+          <a:p>
+            <a:r>
+              <a:rPr lang="de-DE" dirty="0">
+                <a:solidFill>
+                  <a:srgbClr val="000000"/>
+                </a:solidFill>
+                <a:latin typeface="Source Code Pro" panose="020B0509030403020204" pitchFamily="49" charset="0"/>
+              </a:rPr>
+              <a:t>  </a:t>
+            </a:r>
+            <a:r>
+              <a:rPr lang="de-DE" dirty="0">
+                <a:solidFill>
+                  <a:srgbClr val="464646"/>
+                </a:solidFill>
+                <a:latin typeface="Source Code Pro" panose="020B0509030403020204" pitchFamily="49" charset="0"/>
+              </a:rPr>
+              <a:t>"</a:t>
+            </a:r>
+            <a:r>
+              <a:rPr lang="de-DE" dirty="0" err="1">
+                <a:solidFill>
+                  <a:srgbClr val="464646"/>
+                </a:solidFill>
+                <a:latin typeface="Source Code Pro" panose="020B0509030403020204" pitchFamily="49" charset="0"/>
+              </a:rPr>
+              <a:t>uniqueItems</a:t>
+            </a:r>
+            <a:r>
+              <a:rPr lang="de-DE" dirty="0">
+                <a:solidFill>
+                  <a:srgbClr val="464646"/>
+                </a:solidFill>
+                <a:latin typeface="Source Code Pro" panose="020B0509030403020204" pitchFamily="49" charset="0"/>
+              </a:rPr>
+              <a:t>"</a:t>
+            </a:r>
+            <a:r>
+              <a:rPr lang="de-DE" b="1" dirty="0">
+                <a:solidFill>
+                  <a:srgbClr val="4472C4"/>
+                </a:solidFill>
+                <a:latin typeface="Source Code Pro" panose="020B0509030403020204" pitchFamily="49" charset="0"/>
+              </a:rPr>
+              <a:t>:</a:t>
+            </a:r>
+            <a:r>
+              <a:rPr lang="de-DE" dirty="0">
+                <a:solidFill>
+                  <a:srgbClr val="000000"/>
+                </a:solidFill>
+                <a:latin typeface="Source Code Pro" panose="020B0509030403020204" pitchFamily="49" charset="0"/>
+              </a:rPr>
+              <a:t> </a:t>
+            </a:r>
+            <a:r>
+              <a:rPr lang="de-DE" b="1" dirty="0" err="1">
+                <a:solidFill>
+                  <a:srgbClr val="0000FF"/>
+                </a:solidFill>
+                <a:latin typeface="Source Code Pro" panose="020B0509030403020204" pitchFamily="49" charset="0"/>
+              </a:rPr>
+              <a:t>true</a:t>
+            </a:r>
+            <a:endParaRPr lang="de-DE" dirty="0">
+              <a:solidFill>
+                <a:srgbClr val="000000"/>
+              </a:solidFill>
+              <a:latin typeface="Source Code Pro" panose="020B0509030403020204" pitchFamily="49" charset="0"/>
+            </a:endParaRPr>
+          </a:p>
+          <a:p>
+            <a:r>
+              <a:rPr lang="de-DE" b="1" dirty="0">
+                <a:solidFill>
+                  <a:srgbClr val="4472C4"/>
+                </a:solidFill>
+                <a:latin typeface="Source Code Pro" panose="020B0509030403020204" pitchFamily="49" charset="0"/>
+              </a:rPr>
+              <a:t>}</a:t>
+            </a:r>
+            <a:endParaRPr lang="de-DE" dirty="0"/>
+          </a:p>
+        </p:txBody>
+      </p:sp>
+      <p:sp>
+        <p:nvSpPr>
+          <p:cNvPr id="16" name="Rechteck 15">
+            <a:extLst>
+              <a:ext uri="{FF2B5EF4-FFF2-40B4-BE49-F238E27FC236}">
+                <a16:creationId xmlns:a16="http://schemas.microsoft.com/office/drawing/2014/main" id="{4D12402B-0C4D-40DD-A142-A5C26DDD375A}"/>
+              </a:ext>
+            </a:extLst>
+          </p:cNvPr>
+          <p:cNvSpPr/>
+          <p:nvPr/>
+        </p:nvSpPr>
+        <p:spPr>
+          <a:xfrm>
+            <a:off x="6744930" y="4479001"/>
+            <a:ext cx="4608870" cy="369332"/>
+          </a:xfrm>
+          <a:prstGeom prst="rect">
+            <a:avLst/>
+          </a:prstGeom>
+          <a:solidFill>
+            <a:srgbClr val="FFCCCC"/>
+          </a:solidFill>
+          <a:ln>
+            <a:noFill/>
+          </a:ln>
+        </p:spPr>
+        <p:txBody>
+          <a:bodyPr wrap="square">
+            <a:spAutoFit/>
+          </a:bodyPr>
+          <a:lstStyle/>
+          <a:p>
+            <a:r>
+              <a:rPr lang="de-DE" b="1" dirty="0">
+                <a:solidFill>
+                  <a:srgbClr val="4472C4"/>
+                </a:solidFill>
+                <a:latin typeface="Source Code Pro" panose="020B0509030403020204" pitchFamily="49" charset="0"/>
+              </a:rPr>
+              <a:t>[</a:t>
+            </a:r>
+            <a:r>
+              <a:rPr lang="de-DE" dirty="0">
+                <a:solidFill>
+                  <a:srgbClr val="FF8000"/>
+                </a:solidFill>
+                <a:latin typeface="Source Code Pro" panose="020B0509030403020204" pitchFamily="49" charset="0"/>
+              </a:rPr>
+              <a:t>1</a:t>
+            </a:r>
+            <a:r>
+              <a:rPr lang="de-DE" b="1" dirty="0">
+                <a:solidFill>
+                  <a:srgbClr val="4472C4"/>
+                </a:solidFill>
+                <a:latin typeface="Source Code Pro" panose="020B0509030403020204" pitchFamily="49" charset="0"/>
+              </a:rPr>
+              <a:t>,</a:t>
+            </a:r>
+            <a:r>
+              <a:rPr lang="de-DE" dirty="0">
+                <a:solidFill>
+                  <a:srgbClr val="FF8000"/>
+                </a:solidFill>
+                <a:latin typeface="Source Code Pro" panose="020B0509030403020204" pitchFamily="49" charset="0"/>
+              </a:rPr>
+              <a:t>1</a:t>
+            </a:r>
+            <a:r>
+              <a:rPr lang="de-DE" b="1" dirty="0">
+                <a:solidFill>
+                  <a:srgbClr val="4472C4"/>
+                </a:solidFill>
+                <a:latin typeface="Source Code Pro" panose="020B0509030403020204" pitchFamily="49" charset="0"/>
+              </a:rPr>
+              <a:t>]</a:t>
+            </a:r>
+            <a:endParaRPr lang="de-DE" dirty="0"/>
+          </a:p>
+        </p:txBody>
+      </p:sp>
+      <p:sp>
+        <p:nvSpPr>
+          <p:cNvPr id="17" name="Rechteck 16">
+            <a:extLst>
+              <a:ext uri="{FF2B5EF4-FFF2-40B4-BE49-F238E27FC236}">
+                <a16:creationId xmlns:a16="http://schemas.microsoft.com/office/drawing/2014/main" id="{E434DDF9-2595-46A1-BD6E-EFEDFCE2A87C}"/>
+              </a:ext>
+            </a:extLst>
+          </p:cNvPr>
+          <p:cNvSpPr/>
+          <p:nvPr/>
+        </p:nvSpPr>
+        <p:spPr>
+          <a:xfrm>
+            <a:off x="6744930" y="4885766"/>
+            <a:ext cx="4608870" cy="369332"/>
+          </a:xfrm>
+          <a:prstGeom prst="rect">
+            <a:avLst/>
+          </a:prstGeom>
+          <a:solidFill>
+            <a:schemeClr val="accent6">
+              <a:lumMod val="40000"/>
+              <a:lumOff val="60000"/>
+            </a:schemeClr>
+          </a:solidFill>
+          <a:ln>
+            <a:noFill/>
+          </a:ln>
+        </p:spPr>
+        <p:txBody>
+          <a:bodyPr wrap="square">
+            <a:spAutoFit/>
+          </a:bodyPr>
+          <a:lstStyle/>
+          <a:p>
+            <a:r>
+              <a:rPr lang="de-DE" b="1" dirty="0">
+                <a:solidFill>
+                  <a:srgbClr val="4472C4"/>
+                </a:solidFill>
+                <a:latin typeface="Source Code Pro" panose="020B0509030403020204" pitchFamily="49" charset="0"/>
+              </a:rPr>
+              <a:t>[</a:t>
+            </a:r>
+            <a:r>
+              <a:rPr lang="de-DE" dirty="0">
+                <a:solidFill>
+                  <a:srgbClr val="FF8000"/>
+                </a:solidFill>
+                <a:latin typeface="Source Code Pro" panose="020B0509030403020204" pitchFamily="49" charset="0"/>
+              </a:rPr>
+              <a:t>1</a:t>
+            </a:r>
+            <a:r>
+              <a:rPr lang="de-DE" b="1" dirty="0">
+                <a:solidFill>
+                  <a:srgbClr val="4472C4"/>
+                </a:solidFill>
+                <a:latin typeface="Source Code Pro" panose="020B0509030403020204" pitchFamily="49" charset="0"/>
+              </a:rPr>
+              <a:t>,</a:t>
+            </a:r>
+            <a:r>
+              <a:rPr lang="de-DE" dirty="0">
+                <a:solidFill>
+                  <a:srgbClr val="FF8000"/>
+                </a:solidFill>
+                <a:latin typeface="Source Code Pro" panose="020B0509030403020204" pitchFamily="49" charset="0"/>
+              </a:rPr>
+              <a:t>2</a:t>
+            </a:r>
+            <a:r>
+              <a:rPr lang="de-DE" b="1" dirty="0">
+                <a:solidFill>
+                  <a:srgbClr val="4472C4"/>
+                </a:solidFill>
+                <a:latin typeface="Source Code Pro" panose="020B0509030403020204" pitchFamily="49" charset="0"/>
+              </a:rPr>
+              <a:t>]</a:t>
+            </a:r>
+            <a:endParaRPr lang="de-DE" dirty="0">
+              <a:solidFill>
+                <a:srgbClr val="000000"/>
+              </a:solidFill>
+              <a:latin typeface="Source Code Pro" panose="020B0509030403020204" pitchFamily="49" charset="0"/>
+            </a:endParaRPr>
+          </a:p>
+        </p:txBody>
+      </p:sp>
+    </p:spTree>
+    <p:extLst>
+      <p:ext uri="{BB962C8B-B14F-4D97-AF65-F5344CB8AC3E}">
+        <p14:creationId xmlns:p14="http://schemas.microsoft.com/office/powerpoint/2010/main" val="1991531182"/>
+      </p:ext>
+    </p:extLst>
+  </p:cSld>
+  <p:clrMapOvr>
+    <a:masterClrMapping/>
+  </p:clrMapOvr>
+</p:sld>
+</file>
+
+<file path=ppt/slides/slide22.xml><?xml version="1.0" encoding="utf-8"?>
+<p:sld xmlns:a="http://schemas.openxmlformats.org/drawingml/2006/main" xmlns:r="http://schemas.openxmlformats.org/officeDocument/2006/relationships" xmlns:p="http://schemas.openxmlformats.org/presentationml/2006/main">
+  <p:cSld>
+    <p:spTree>
+      <p:nvGrpSpPr>
+        <p:cNvPr id="1" name=""/>
+        <p:cNvGrpSpPr/>
+        <p:nvPr/>
+      </p:nvGrpSpPr>
+      <p:grpSpPr>
+        <a:xfrm>
+          <a:off x="0" y="0"/>
+          <a:ext cx="0" cy="0"/>
+          <a:chOff x="0" y="0"/>
+          <a:chExt cx="0" cy="0"/>
+        </a:xfrm>
+      </p:grpSpPr>
+      <p:sp>
+        <p:nvSpPr>
+          <p:cNvPr id="2" name="Titel 1">
+            <a:extLst>
+              <a:ext uri="{FF2B5EF4-FFF2-40B4-BE49-F238E27FC236}">
+                <a16:creationId xmlns:a16="http://schemas.microsoft.com/office/drawing/2014/main" id="{263B568C-3395-4B3C-80D7-E8AF938BCCCC}"/>
+              </a:ext>
+            </a:extLst>
+          </p:cNvPr>
+          <p:cNvSpPr>
+            <a:spLocks noGrp="1"/>
+          </p:cNvSpPr>
+          <p:nvPr>
+            <p:ph type="title"/>
+          </p:nvPr>
+        </p:nvSpPr>
+        <p:spPr/>
+        <p:txBody>
+          <a:bodyPr/>
+          <a:lstStyle/>
+          <a:p>
+            <a:r>
+              <a:rPr lang="de-DE" dirty="0"/>
+              <a:t>Komplexe Wertebereiche</a:t>
+            </a:r>
+          </a:p>
+        </p:txBody>
+      </p:sp>
+      <p:sp>
+        <p:nvSpPr>
+          <p:cNvPr id="3" name="Inhaltsplatzhalter 2">
+            <a:extLst>
+              <a:ext uri="{FF2B5EF4-FFF2-40B4-BE49-F238E27FC236}">
+                <a16:creationId xmlns:a16="http://schemas.microsoft.com/office/drawing/2014/main" id="{CBF494EF-36B2-44DD-92ED-0034DFBAA22F}"/>
+              </a:ext>
+            </a:extLst>
+          </p:cNvPr>
+          <p:cNvSpPr>
+            <a:spLocks noGrp="1"/>
+          </p:cNvSpPr>
+          <p:nvPr>
+            <p:ph idx="1"/>
+          </p:nvPr>
+        </p:nvSpPr>
+        <p:spPr>
+          <a:xfrm>
+            <a:off x="838200" y="1825625"/>
+            <a:ext cx="10515600" cy="4351338"/>
+          </a:xfrm>
+        </p:spPr>
+        <p:txBody>
+          <a:bodyPr/>
+          <a:lstStyle/>
+          <a:p>
+            <a:r>
+              <a:rPr lang="de-DE" dirty="0" err="1"/>
+              <a:t>allOf</a:t>
+            </a:r>
+            <a:r>
+              <a:rPr lang="de-DE" dirty="0"/>
+              <a:t>/</a:t>
+            </a:r>
+            <a:r>
+              <a:rPr lang="de-DE" dirty="0" err="1"/>
+              <a:t>anyOf</a:t>
+            </a:r>
+            <a:r>
+              <a:rPr lang="de-DE" dirty="0"/>
+              <a:t>/</a:t>
+            </a:r>
+            <a:r>
+              <a:rPr lang="de-DE" dirty="0" err="1"/>
+              <a:t>oneOf</a:t>
+            </a:r>
+            <a:r>
+              <a:rPr lang="de-DE" dirty="0"/>
+              <a:t>/not</a:t>
+            </a:r>
+          </a:p>
+        </p:txBody>
+      </p:sp>
+      <p:sp>
+        <p:nvSpPr>
+          <p:cNvPr id="4" name="Datumsplatzhalter 3">
+            <a:extLst>
+              <a:ext uri="{FF2B5EF4-FFF2-40B4-BE49-F238E27FC236}">
+                <a16:creationId xmlns:a16="http://schemas.microsoft.com/office/drawing/2014/main" id="{25837733-F8B3-4C3E-A803-5F05F95FB3DC}"/>
+              </a:ext>
+            </a:extLst>
+          </p:cNvPr>
+          <p:cNvSpPr>
+            <a:spLocks noGrp="1"/>
+          </p:cNvSpPr>
+          <p:nvPr>
+            <p:ph type="dt" sz="half" idx="10"/>
+          </p:nvPr>
+        </p:nvSpPr>
+        <p:spPr/>
+        <p:txBody>
+          <a:bodyPr/>
+          <a:lstStyle/>
+          <a:p>
+            <a:fld id="{CFFA1D88-5C5F-47BF-8575-62828799C3D3}" type="datetime1">
+              <a:rPr lang="de-DE" smtClean="0"/>
+              <a:t>09.12.2017</a:t>
+            </a:fld>
+            <a:endParaRPr lang="de-DE" dirty="0"/>
+          </a:p>
+        </p:txBody>
+      </p:sp>
+      <p:sp>
+        <p:nvSpPr>
+          <p:cNvPr id="5" name="Fußzeilenplatzhalter 4">
+            <a:extLst>
+              <a:ext uri="{FF2B5EF4-FFF2-40B4-BE49-F238E27FC236}">
+                <a16:creationId xmlns:a16="http://schemas.microsoft.com/office/drawing/2014/main" id="{37F17228-D4D8-4BBB-A244-7340EF0FE22B}"/>
+              </a:ext>
+            </a:extLst>
+          </p:cNvPr>
+          <p:cNvSpPr>
+            <a:spLocks noGrp="1"/>
+          </p:cNvSpPr>
+          <p:nvPr>
+            <p:ph type="ftr" sz="quarter" idx="11"/>
+          </p:nvPr>
+        </p:nvSpPr>
+        <p:spPr/>
+        <p:txBody>
+          <a:bodyPr/>
+          <a:lstStyle/>
+          <a:p>
+            <a:r>
+              <a:rPr lang="de-DE"/>
+              <a:t>Daniel Flasch</a:t>
+            </a:r>
+            <a:endParaRPr lang="de-DE" dirty="0"/>
+          </a:p>
+        </p:txBody>
+      </p:sp>
+      <p:sp>
+        <p:nvSpPr>
+          <p:cNvPr id="6" name="Foliennummernplatzhalter 5">
+            <a:extLst>
+              <a:ext uri="{FF2B5EF4-FFF2-40B4-BE49-F238E27FC236}">
+                <a16:creationId xmlns:a16="http://schemas.microsoft.com/office/drawing/2014/main" id="{0A3B9615-9A42-4020-ABBE-BFFD4333625F}"/>
+              </a:ext>
+            </a:extLst>
+          </p:cNvPr>
+          <p:cNvSpPr>
+            <a:spLocks noGrp="1"/>
+          </p:cNvSpPr>
+          <p:nvPr>
+            <p:ph type="sldNum" sz="quarter" idx="12"/>
+          </p:nvPr>
+        </p:nvSpPr>
+        <p:spPr/>
+        <p:txBody>
+          <a:bodyPr/>
+          <a:lstStyle/>
+          <a:p>
+            <a:fld id="{4DEAFF03-B2A3-4F10-AFBA-713F9B73CAA7}" type="slidenum">
+              <a:rPr lang="de-DE" smtClean="0"/>
+              <a:t>21</a:t>
             </a:fld>
             <a:endParaRPr lang="de-DE"/>
           </a:p>
@@ -14103,7 +16565,7 @@
 </p:sld>
 </file>
 
-<file path=ppt/slides/slide21.xml><?xml version="1.0" encoding="utf-8"?>
+<file path=ppt/slides/slide23.xml><?xml version="1.0" encoding="utf-8"?>
 <p:sld xmlns:a="http://schemas.openxmlformats.org/drawingml/2006/main" xmlns:r="http://schemas.openxmlformats.org/officeDocument/2006/relationships" xmlns:p="http://schemas.openxmlformats.org/presentationml/2006/main">
   <p:cSld>
     <p:spTree>
@@ -14284,15 +16746,7 @@
             </a:r>
             <a:r>
               <a:rPr lang="de-DE" dirty="0"/>
-              <a:t>, hinter der die </a:t>
-            </a:r>
-            <a:r>
-              <a:rPr lang="de-DE" dirty="0" err="1"/>
-              <a:t>Defintion</a:t>
-            </a:r>
-            <a:r>
-              <a:rPr lang="de-DE" dirty="0"/>
-              <a:t> liegt</a:t>
+              <a:t>, hinter der die Definition liegt</a:t>
             </a:r>
           </a:p>
           <a:p>
@@ -14384,7 +16838,7 @@
           <a:p>
             <a:fld id="{4DEAFF03-B2A3-4F10-AFBA-713F9B73CAA7}" type="slidenum">
               <a:rPr lang="de-DE" smtClean="0"/>
-              <a:t>20</a:t>
+              <a:t>22</a:t>
             </a:fld>
             <a:endParaRPr lang="de-DE"/>
           </a:p>
@@ -14572,7 +17026,7 @@
 </p:sld>
 </file>
 
-<file path=ppt/slides/slide22.xml><?xml version="1.0" encoding="utf-8"?>
+<file path=ppt/slides/slide24.xml><?xml version="1.0" encoding="utf-8"?>
 <p:sld xmlns:a="http://schemas.openxmlformats.org/drawingml/2006/main" xmlns:r="http://schemas.openxmlformats.org/officeDocument/2006/relationships" xmlns:p="http://schemas.openxmlformats.org/presentationml/2006/main">
   <p:cSld>
     <p:spTree>
@@ -14698,7 +17152,7 @@
           <a:p>
             <a:fld id="{4DEAFF03-B2A3-4F10-AFBA-713F9B73CAA7}" type="slidenum">
               <a:rPr lang="de-DE" smtClean="0"/>
-              <a:t>21</a:t>
+              <a:t>23</a:t>
             </a:fld>
             <a:endParaRPr lang="de-DE"/>
           </a:p>
@@ -17074,7 +19528,7 @@
 </p:sld>
 </file>
 
-<file path=ppt/slides/slide23.xml><?xml version="1.0" encoding="utf-8"?>
+<file path=ppt/slides/slide25.xml><?xml version="1.0" encoding="utf-8"?>
 <p:sld xmlns:a="http://schemas.openxmlformats.org/drawingml/2006/main" xmlns:r="http://schemas.openxmlformats.org/officeDocument/2006/relationships" xmlns:p="http://schemas.openxmlformats.org/presentationml/2006/main">
   <p:cSld>
     <p:spTree>
@@ -17214,7 +19668,7 @@
 </p:sld>
 </file>
 
-<file path=ppt/slides/slide24.xml><?xml version="1.0" encoding="utf-8"?>
+<file path=ppt/slides/slide26.xml><?xml version="1.0" encoding="utf-8"?>
 <p:sld xmlns:a="http://schemas.openxmlformats.org/drawingml/2006/main" xmlns:r="http://schemas.openxmlformats.org/officeDocument/2006/relationships" xmlns:p="http://schemas.openxmlformats.org/presentationml/2006/main">
   <p:cSld>
     <p:spTree>
@@ -17254,7 +19708,7 @@
           <a:p>
             <a:r>
               <a:rPr lang="de-DE" dirty="0"/>
-              <a:t>Link zur Präsentation</a:t>
+              <a:t>Links</a:t>
             </a:r>
           </a:p>
         </p:txBody>
@@ -17281,39 +19735,78 @@
           <a:lstStyle/>
           <a:p>
             <a:r>
-              <a:rPr lang="de-DE" b="1" dirty="0">
+              <a:rPr lang="de-DE" b="1" dirty="0"/>
+              <a:t>Präsentation</a:t>
+            </a:r>
+          </a:p>
+          <a:p>
+            <a:pPr lvl="1"/>
+            <a:r>
+              <a:rPr lang="de-DE" dirty="0">
                 <a:hlinkClick r:id="rId2"/>
               </a:rPr>
               <a:t>https://git.io/vbBcw</a:t>
             </a:r>
             <a:r>
+              <a:rPr lang="de-DE" dirty="0"/>
+              <a:t> (PowerPoint)</a:t>
+            </a:r>
+          </a:p>
+          <a:p>
+            <a:pPr lvl="1"/>
+            <a:r>
+              <a:rPr lang="de-DE" dirty="0">
+                <a:hlinkClick r:id="rId3"/>
+              </a:rPr>
+              <a:t>https://git.io/vbBcA</a:t>
+            </a:r>
+            <a:r>
+              <a:rPr lang="de-DE" dirty="0"/>
+              <a:t> (PDF)</a:t>
+            </a:r>
+          </a:p>
+          <a:p>
+            <a:r>
               <a:rPr lang="de-DE" b="1" dirty="0"/>
-              <a:t> (</a:t>
-            </a:r>
-            <a:r>
-              <a:rPr lang="de-DE" b="1" dirty="0" err="1"/>
-              <a:t>Powerpoint</a:t>
-            </a:r>
+              <a:t>Übungsseite</a:t>
+            </a:r>
+          </a:p>
+          <a:p>
+            <a:pPr lvl="1"/>
+            <a:r>
+              <a:rPr lang="de-DE"/>
+              <a:t>194.95.221.248:8080</a:t>
+            </a:r>
+            <a:endParaRPr lang="de-DE" dirty="0"/>
+          </a:p>
+          <a:p>
             <a:r>
               <a:rPr lang="de-DE" b="1" dirty="0"/>
-              <a:t>)</a:t>
-            </a:r>
-          </a:p>
-          <a:p>
-            <a:r>
-              <a:rPr lang="de-DE" b="1" dirty="0">
-                <a:hlinkClick r:id="rId3"/>
-              </a:rPr>
-              <a:t>https://git.io/vbBcA</a:t>
-            </a:r>
-            <a:r>
-              <a:rPr lang="de-DE" b="1" dirty="0"/>
-              <a:t> (PDF)</a:t>
+              <a:t>Quellen</a:t>
+            </a:r>
+          </a:p>
+          <a:p>
+            <a:pPr lvl="1"/>
+            <a:r>
+              <a:rPr lang="de-DE" dirty="0">
+                <a:hlinkClick r:id="rId4"/>
+              </a:rPr>
+              <a:t>http://json-schema.org/</a:t>
+            </a:r>
+          </a:p>
+          <a:p>
+            <a:pPr lvl="1"/>
+            <a:r>
+              <a:rPr lang="de-DE" dirty="0">
+                <a:hlinkClick r:id="rId4"/>
+              </a:rPr>
+              <a:t>https://spacetelescope.github.io/understanding-json-schema/</a:t>
             </a:r>
             <a:endParaRPr lang="de-DE" dirty="0"/>
           </a:p>
           <a:p>
-            <a:endParaRPr lang="de-DE" dirty="0"/>
+            <a:pPr lvl="1"/>
+            <a:endParaRPr lang="de-DE" b="1" dirty="0"/>
           </a:p>
         </p:txBody>
       </p:sp>
@@ -17340,7 +19833,7 @@
           <a:p>
             <a:fld id="{CFFA1D88-5C5F-47BF-8575-62828799C3D3}" type="datetime1">
               <a:rPr lang="de-DE" smtClean="0"/>
-              <a:t>09.12.2017</a:t>
+              <a:t>10.12.2017</a:t>
             </a:fld>
             <a:endParaRPr lang="de-DE" dirty="0"/>
           </a:p>
@@ -17398,7 +19891,7 @@
           <a:p>
             <a:fld id="{4DEAFF03-B2A3-4F10-AFBA-713F9B73CAA7}" type="slidenum">
               <a:rPr lang="de-DE" smtClean="0"/>
-              <a:t>23</a:t>
+              <a:t>25</a:t>
             </a:fld>
             <a:endParaRPr lang="de-DE"/>
           </a:p>
@@ -17408,193 +19901,6 @@
     <p:extLst>
       <p:ext uri="{BB962C8B-B14F-4D97-AF65-F5344CB8AC3E}">
         <p14:creationId xmlns:p14="http://schemas.microsoft.com/office/powerpoint/2010/main" val="1299120610"/>
-      </p:ext>
-    </p:extLst>
-  </p:cSld>
-  <p:clrMapOvr>
-    <a:masterClrMapping/>
-  </p:clrMapOvr>
-</p:sld>
-</file>
-
-<file path=ppt/slides/slide25.xml><?xml version="1.0" encoding="utf-8"?>
-<p:sld xmlns:a="http://schemas.openxmlformats.org/drawingml/2006/main" xmlns:r="http://schemas.openxmlformats.org/officeDocument/2006/relationships" xmlns:p="http://schemas.openxmlformats.org/presentationml/2006/main">
-  <p:cSld>
-    <p:spTree>
-      <p:nvGrpSpPr>
-        <p:cNvPr id="1" name=""/>
-        <p:cNvGrpSpPr/>
-        <p:nvPr/>
-      </p:nvGrpSpPr>
-      <p:grpSpPr>
-        <a:xfrm>
-          <a:off x="0" y="0"/>
-          <a:ext cx="0" cy="0"/>
-          <a:chOff x="0" y="0"/>
-          <a:chExt cx="0" cy="0"/>
-        </a:xfrm>
-      </p:grpSpPr>
-      <p:sp>
-        <p:nvSpPr>
-          <p:cNvPr id="2" name="Titel 1">
-            <a:extLst>
-              <a:ext uri="{FF2B5EF4-FFF2-40B4-BE49-F238E27FC236}">
-                <a16:creationId xmlns:a16="http://schemas.microsoft.com/office/drawing/2014/main" id="{263B568C-3395-4B3C-80D7-E8AF938BCCCC}"/>
-              </a:ext>
-            </a:extLst>
-          </p:cNvPr>
-          <p:cNvSpPr>
-            <a:spLocks noGrp="1"/>
-          </p:cNvSpPr>
-          <p:nvPr>
-            <p:ph type="title"/>
-          </p:nvPr>
-        </p:nvSpPr>
-        <p:spPr/>
-        <p:txBody>
-          <a:bodyPr/>
-          <a:lstStyle/>
-          <a:p>
-            <a:r>
-              <a:rPr lang="de-DE" dirty="0"/>
-              <a:t>Quellen</a:t>
-            </a:r>
-          </a:p>
-        </p:txBody>
-      </p:sp>
-      <p:sp>
-        <p:nvSpPr>
-          <p:cNvPr id="3" name="Inhaltsplatzhalter 2">
-            <a:extLst>
-              <a:ext uri="{FF2B5EF4-FFF2-40B4-BE49-F238E27FC236}">
-                <a16:creationId xmlns:a16="http://schemas.microsoft.com/office/drawing/2014/main" id="{4D16E770-B7EC-4A78-BCD9-0A5FFBF67064}"/>
-              </a:ext>
-            </a:extLst>
-          </p:cNvPr>
-          <p:cNvSpPr>
-            <a:spLocks noGrp="1"/>
-          </p:cNvSpPr>
-          <p:nvPr>
-            <p:ph idx="1"/>
-          </p:nvPr>
-        </p:nvSpPr>
-        <p:spPr/>
-        <p:txBody>
-          <a:bodyPr/>
-          <a:lstStyle/>
-          <a:p>
-            <a:r>
-              <a:rPr lang="de-DE" b="1" dirty="0">
-                <a:hlinkClick r:id="rId2"/>
-              </a:rPr>
-              <a:t>http://json-schema.org/</a:t>
-            </a:r>
-          </a:p>
-          <a:p>
-            <a:r>
-              <a:rPr lang="de-DE" b="1" dirty="0">
-                <a:hlinkClick r:id="rId2"/>
-              </a:rPr>
-              <a:t>https://spacetelescope.github.io/understanding-json-schema/</a:t>
-            </a:r>
-            <a:endParaRPr lang="de-DE" b="1" dirty="0"/>
-          </a:p>
-          <a:p>
-            <a:endParaRPr lang="de-DE" dirty="0"/>
-          </a:p>
-        </p:txBody>
-      </p:sp>
-      <p:sp>
-        <p:nvSpPr>
-          <p:cNvPr id="4" name="Datumsplatzhalter 3">
-            <a:extLst>
-              <a:ext uri="{FF2B5EF4-FFF2-40B4-BE49-F238E27FC236}">
-                <a16:creationId xmlns:a16="http://schemas.microsoft.com/office/drawing/2014/main" id="{25837733-F8B3-4C3E-A803-5F05F95FB3DC}"/>
-              </a:ext>
-            </a:extLst>
-          </p:cNvPr>
-          <p:cNvSpPr>
-            <a:spLocks noGrp="1"/>
-          </p:cNvSpPr>
-          <p:nvPr>
-            <p:ph type="dt" sz="half" idx="10"/>
-          </p:nvPr>
-        </p:nvSpPr>
-        <p:spPr/>
-        <p:txBody>
-          <a:bodyPr/>
-          <a:lstStyle/>
-          <a:p>
-            <a:fld id="{CFFA1D88-5C5F-47BF-8575-62828799C3D3}" type="datetime1">
-              <a:rPr lang="de-DE" smtClean="0"/>
-              <a:t>09.12.2017</a:t>
-            </a:fld>
-            <a:endParaRPr lang="de-DE" dirty="0"/>
-          </a:p>
-        </p:txBody>
-      </p:sp>
-      <p:sp>
-        <p:nvSpPr>
-          <p:cNvPr id="5" name="Fußzeilenplatzhalter 4">
-            <a:extLst>
-              <a:ext uri="{FF2B5EF4-FFF2-40B4-BE49-F238E27FC236}">
-                <a16:creationId xmlns:a16="http://schemas.microsoft.com/office/drawing/2014/main" id="{37F17228-D4D8-4BBB-A244-7340EF0FE22B}"/>
-              </a:ext>
-            </a:extLst>
-          </p:cNvPr>
-          <p:cNvSpPr>
-            <a:spLocks noGrp="1"/>
-          </p:cNvSpPr>
-          <p:nvPr>
-            <p:ph type="ftr" sz="quarter" idx="11"/>
-          </p:nvPr>
-        </p:nvSpPr>
-        <p:spPr/>
-        <p:txBody>
-          <a:bodyPr/>
-          <a:lstStyle/>
-          <a:p>
-            <a:r>
-              <a:rPr lang="de-DE"/>
-              <a:t>Daniel Flasch</a:t>
-            </a:r>
-            <a:endParaRPr lang="de-DE" dirty="0"/>
-          </a:p>
-        </p:txBody>
-      </p:sp>
-      <p:sp>
-        <p:nvSpPr>
-          <p:cNvPr id="6" name="Foliennummernplatzhalter 5">
-            <a:extLst>
-              <a:ext uri="{FF2B5EF4-FFF2-40B4-BE49-F238E27FC236}">
-                <a16:creationId xmlns:a16="http://schemas.microsoft.com/office/drawing/2014/main" id="{0A3B9615-9A42-4020-ABBE-BFFD4333625F}"/>
-              </a:ext>
-            </a:extLst>
-          </p:cNvPr>
-          <p:cNvSpPr>
-            <a:spLocks noGrp="1"/>
-          </p:cNvSpPr>
-          <p:nvPr>
-            <p:ph type="sldNum" sz="quarter" idx="12"/>
-          </p:nvPr>
-        </p:nvSpPr>
-        <p:spPr/>
-        <p:txBody>
-          <a:bodyPr/>
-          <a:lstStyle/>
-          <a:p>
-            <a:fld id="{4DEAFF03-B2A3-4F10-AFBA-713F9B73CAA7}" type="slidenum">
-              <a:rPr lang="de-DE" smtClean="0"/>
-              <a:t>24</a:t>
-            </a:fld>
-            <a:endParaRPr lang="de-DE"/>
-          </a:p>
-        </p:txBody>
-      </p:sp>
-    </p:spTree>
-    <p:extLst>
-      <p:ext uri="{BB962C8B-B14F-4D97-AF65-F5344CB8AC3E}">
-        <p14:creationId xmlns:p14="http://schemas.microsoft.com/office/powerpoint/2010/main" val="3345162938"/>
       </p:ext>
     </p:extLst>
   </p:cSld>

</xml_diff>